<commit_message>
Deleted effects and changed graphics
</commit_message>
<xml_diff>
--- a/doc/task02/Task2_fin_v2.pptx
+++ b/doc/task02/Task2_fin_v2.pptx
@@ -177,7 +177,7 @@
     </p:spTree>
     <p:extLst>
       <p:ext uri="{BB962C8B-B14F-4D97-AF65-F5344CB8AC3E}">
-        <p14:creationId xmlns:p14="http://schemas.microsoft.com/office/powerpoint/2010/main" xmlns="" val="2021866727"/>
+        <p14:creationId xmlns:p14="http://schemas.microsoft.com/office/powerpoint/2010/main" val="2021866727"/>
       </p:ext>
     </p:extLst>
   </p:cSld>
@@ -371,7 +371,7 @@
     </p:spTree>
     <p:extLst>
       <p:ext uri="{BB962C8B-B14F-4D97-AF65-F5344CB8AC3E}">
-        <p14:creationId xmlns:p14="http://schemas.microsoft.com/office/powerpoint/2010/main" xmlns="" val="3202879926"/>
+        <p14:creationId xmlns:p14="http://schemas.microsoft.com/office/powerpoint/2010/main" val="3202879926"/>
       </p:ext>
     </p:extLst>
   </p:cSld>
@@ -466,7 +466,7 @@
     </p:spTree>
     <p:extLst>
       <p:ext uri="{BB962C8B-B14F-4D97-AF65-F5344CB8AC3E}">
-        <p14:creationId xmlns:p14="http://schemas.microsoft.com/office/powerpoint/2010/main" xmlns="" val="3211500459"/>
+        <p14:creationId xmlns:p14="http://schemas.microsoft.com/office/powerpoint/2010/main" val="3211500459"/>
       </p:ext>
     </p:extLst>
   </p:cSld>
@@ -561,7 +561,7 @@
     </p:spTree>
     <p:extLst>
       <p:ext uri="{BB962C8B-B14F-4D97-AF65-F5344CB8AC3E}">
-        <p14:creationId xmlns:p14="http://schemas.microsoft.com/office/powerpoint/2010/main" xmlns="" val="2939979431"/>
+        <p14:creationId xmlns:p14="http://schemas.microsoft.com/office/powerpoint/2010/main" val="2939979431"/>
       </p:ext>
     </p:extLst>
   </p:cSld>
@@ -656,7 +656,7 @@
     </p:spTree>
     <p:extLst>
       <p:ext uri="{BB962C8B-B14F-4D97-AF65-F5344CB8AC3E}">
-        <p14:creationId xmlns:p14="http://schemas.microsoft.com/office/powerpoint/2010/main" xmlns="" val="2653004341"/>
+        <p14:creationId xmlns:p14="http://schemas.microsoft.com/office/powerpoint/2010/main" val="2653004341"/>
       </p:ext>
     </p:extLst>
   </p:cSld>
@@ -4330,9 +4330,14 @@
   <p:clrMapOvr>
     <a:masterClrMapping/>
   </p:clrMapOvr>
-  <p:transition spd="med">
-    <p:dissolve/>
-  </p:transition>
+  <mc:AlternateContent xmlns:mc="http://schemas.openxmlformats.org/markup-compatibility/2006" xmlns:p14="http://schemas.microsoft.com/office/powerpoint/2010/main">
+    <mc:Choice Requires="p14">
+      <p:transition p14:dur="0"/>
+    </mc:Choice>
+    <mc:Fallback xmlns="">
+      <p:transition/>
+    </mc:Fallback>
+  </mc:AlternateContent>
   <p:timing>
     <p:tnLst>
       <p:par>
@@ -4642,9 +4647,14 @@
   <p:clrMapOvr>
     <a:masterClrMapping/>
   </p:clrMapOvr>
-  <p:transition spd="med">
-    <p:dissolve/>
-  </p:transition>
+  <mc:AlternateContent xmlns:mc="http://schemas.openxmlformats.org/markup-compatibility/2006" xmlns:p14="http://schemas.microsoft.com/office/powerpoint/2010/main">
+    <mc:Choice Requires="p14">
+      <p:transition p14:dur="0"/>
+    </mc:Choice>
+    <mc:Fallback xmlns="">
+      <p:transition/>
+    </mc:Fallback>
+  </mc:AlternateContent>
   <p:timing>
     <p:tnLst>
       <p:par>
@@ -4824,9 +4834,14 @@
   <p:clrMapOvr>
     <a:masterClrMapping/>
   </p:clrMapOvr>
-  <p:transition spd="med">
-    <p:dissolve/>
-  </p:transition>
+  <mc:AlternateContent xmlns:mc="http://schemas.openxmlformats.org/markup-compatibility/2006" xmlns:p14="http://schemas.microsoft.com/office/powerpoint/2010/main">
+    <mc:Choice Requires="p14">
+      <p:transition p14:dur="0"/>
+    </mc:Choice>
+    <mc:Fallback xmlns="">
+      <p:transition/>
+    </mc:Fallback>
+  </mc:AlternateContent>
 </p:sld>
 </file>
 
@@ -6380,9 +6395,14 @@
   <p:clrMapOvr>
     <a:masterClrMapping/>
   </p:clrMapOvr>
-  <p:transition spd="med">
-    <p:dissolve/>
-  </p:transition>
+  <mc:AlternateContent xmlns:mc="http://schemas.openxmlformats.org/markup-compatibility/2006" xmlns:p14="http://schemas.microsoft.com/office/powerpoint/2010/main">
+    <mc:Choice Requires="p14">
+      <p:transition p14:dur="0"/>
+    </mc:Choice>
+    <mc:Fallback xmlns="">
+      <p:transition/>
+    </mc:Fallback>
+  </mc:AlternateContent>
   <p:timing>
     <p:tnLst>
       <p:par>
@@ -6487,30 +6507,56 @@
       </p:sp>
       <p:pic>
         <p:nvPicPr>
-          <p:cNvPr id="94" name="image3.png"/>
-          <p:cNvPicPr/>
+          <p:cNvPr id="1026" name="Picture 2"/>
+          <p:cNvPicPr>
+            <a:picLocks noChangeAspect="1" noChangeArrowheads="1"/>
+          </p:cNvPicPr>
           <p:nvPr/>
         </p:nvPicPr>
         <p:blipFill>
           <a:blip r:embed="rId3">
-            <a:extLst/>
+            <a:extLst>
+              <a:ext uri="{28A0092B-C50C-407E-A947-70E740481C1C}">
+                <a14:useLocalDpi xmlns:a14="http://schemas.microsoft.com/office/drawing/2010/main" val="0"/>
+              </a:ext>
+            </a:extLst>
           </a:blip>
-          <a:srcRect l="30049" t="15863" r="27259" b="14264"/>
+          <a:srcRect/>
           <a:stretch>
             <a:fillRect/>
           </a:stretch>
         </p:blipFill>
-        <p:spPr>
+        <p:spPr bwMode="auto">
           <a:xfrm>
-            <a:off x="1194451" y="760964"/>
-            <a:ext cx="6439212" cy="5525543"/>
+            <a:off x="1280159" y="718802"/>
+            <a:ext cx="6137275" cy="5309887"/>
           </a:xfrm>
           <a:prstGeom prst="rect">
             <a:avLst/>
           </a:prstGeom>
-          <a:ln w="12700">
-            <a:miter lim="400000"/>
+          <a:noFill/>
+          <a:ln>
+            <a:noFill/>
           </a:ln>
+          <a:extLst>
+            <a:ext uri="{909E8E84-426E-40DD-AFC4-6F175D3DCCD1}">
+              <a14:hiddenFill xmlns:a14="http://schemas.microsoft.com/office/drawing/2010/main">
+                <a:solidFill>
+                  <a:schemeClr val="accent1"/>
+                </a:solidFill>
+              </a14:hiddenFill>
+            </a:ext>
+            <a:ext uri="{91240B29-F687-4F45-9708-019B960494DF}">
+              <a14:hiddenLine xmlns:a14="http://schemas.microsoft.com/office/drawing/2010/main" w="9525">
+                <a:solidFill>
+                  <a:schemeClr val="tx1"/>
+                </a:solidFill>
+                <a:miter lim="800000"/>
+                <a:headEnd/>
+                <a:tailEnd/>
+              </a14:hiddenLine>
+            </a:ext>
+          </a:extLst>
         </p:spPr>
       </p:pic>
     </p:spTree>
@@ -6518,9 +6564,14 @@
   <p:clrMapOvr>
     <a:masterClrMapping/>
   </p:clrMapOvr>
-  <p:transition spd="med">
-    <p:dissolve/>
-  </p:transition>
+  <mc:AlternateContent xmlns:mc="http://schemas.openxmlformats.org/markup-compatibility/2006" xmlns:p14="http://schemas.microsoft.com/office/powerpoint/2010/main">
+    <mc:Choice Requires="p14">
+      <p:transition p14:dur="0"/>
+    </mc:Choice>
+    <mc:Fallback xmlns="">
+      <p:transition/>
+    </mc:Fallback>
+  </mc:AlternateContent>
   <p:timing>
     <p:tnLst>
       <p:par>
@@ -6684,9 +6735,14 @@
   <p:clrMapOvr>
     <a:masterClrMapping/>
   </p:clrMapOvr>
-  <p:transition spd="med">
-    <p:dissolve/>
-  </p:transition>
+  <mc:AlternateContent xmlns:mc="http://schemas.openxmlformats.org/markup-compatibility/2006" xmlns:p14="http://schemas.microsoft.com/office/powerpoint/2010/main">
+    <mc:Choice Requires="p14">
+      <p:transition p14:dur="0"/>
+    </mc:Choice>
+    <mc:Fallback xmlns="">
+      <p:transition/>
+    </mc:Fallback>
+  </mc:AlternateContent>
 </p:sld>
 </file>
 

</xml_diff>

<commit_message>
Added the new table
</commit_message>
<xml_diff>
--- a/doc/task02/Task2_fin_v2.pptx
+++ b/doc/task02/Task2_fin_v2.pptx
@@ -551,10 +551,7 @@
             <a:pPr lvl="0">
               <a:defRPr sz="1800"/>
             </a:pPr>
-            <a:r>
-              <a:rPr sz="1200"/>
-              <a:t>Agenda: Terminerfassung Patient Doktor Ort</a:t>
-            </a:r>
+            <a:endParaRPr sz="1200" dirty="0"/>
           </a:p>
         </p:txBody>
       </p:sp>
@@ -1518,7 +1515,7 @@
             <a:effectLst/>
             <a:extLst>
               <a:ext uri="{C572A759-6A51-4108-AA02-DFA0A04FC94B}">
-                <ma14:wrappingTextBoxFlag xmlns="" xmlns:ma14="http://schemas.microsoft.com/office/mac/drawingml/2011/main" val="1"/>
+                <ma14:wrappingTextBoxFlag xmlns:ma14="http://schemas.microsoft.com/office/mac/drawingml/2011/main" xmlns="" val="1"/>
               </a:ext>
             </a:extLst>
           </p:spPr>
@@ -3012,7 +3009,7 @@
           </a:ln>
           <a:extLst>
             <a:ext uri="{C572A759-6A51-4108-AA02-DFA0A04FC94B}">
-              <ma14:wrappingTextBoxFlag xmlns="" xmlns:ma14="http://schemas.microsoft.com/office/mac/drawingml/2011/main" val="1"/>
+              <ma14:wrappingTextBoxFlag xmlns:ma14="http://schemas.microsoft.com/office/mac/drawingml/2011/main" xmlns="" val="1"/>
             </a:ext>
           </a:extLst>
         </p:spPr>
@@ -3104,7 +3101,7 @@
           </a:ln>
           <a:extLst>
             <a:ext uri="{C572A759-6A51-4108-AA02-DFA0A04FC94B}">
-              <ma14:wrappingTextBoxFlag xmlns="" xmlns:ma14="http://schemas.microsoft.com/office/mac/drawingml/2011/main" val="1"/>
+              <ma14:wrappingTextBoxFlag xmlns:ma14="http://schemas.microsoft.com/office/mac/drawingml/2011/main" xmlns="" val="1"/>
             </a:ext>
           </a:extLst>
         </p:spPr>
@@ -3166,7 +3163,7 @@
           </a:ln>
           <a:extLst>
             <a:ext uri="{C572A759-6A51-4108-AA02-DFA0A04FC94B}">
-              <ma14:wrappingTextBoxFlag xmlns="" xmlns:ma14="http://schemas.microsoft.com/office/mac/drawingml/2011/main" val="1"/>
+              <ma14:wrappingTextBoxFlag xmlns:ma14="http://schemas.microsoft.com/office/mac/drawingml/2011/main" xmlns="" val="1"/>
             </a:ext>
           </a:extLst>
         </p:spPr>
@@ -4907,455 +4904,394 @@
       </p:sp>
       <p:graphicFrame>
         <p:nvGraphicFramePr>
-          <p:cNvPr id="89" name="Table 89"/>
-          <p:cNvGraphicFramePr/>
-          <p:nvPr/>
+          <p:cNvPr id="3" name="Tabelle 2"/>
+          <p:cNvGraphicFramePr>
+            <a:graphicFrameLocks noGrp="1"/>
+          </p:cNvGraphicFramePr>
+          <p:nvPr>
+            <p:extLst>
+              <p:ext uri="{D42A27DB-BD31-4B8C-83A1-F6EECF244321}">
+                <p14:modId xmlns:p14="http://schemas.microsoft.com/office/powerpoint/2010/main" val="788261781"/>
+              </p:ext>
+            </p:extLst>
+          </p:nvPr>
         </p:nvGraphicFramePr>
         <p:xfrm>
-          <a:off x="451945" y="1086274"/>
-          <a:ext cx="8387255" cy="6145801"/>
+          <a:off x="869470" y="948785"/>
+          <a:ext cx="7813136" cy="5242289"/>
         </p:xfrm>
         <a:graphic>
           <a:graphicData uri="http://schemas.openxmlformats.org/drawingml/2006/table">
             <a:tbl>
               <a:tblPr firstRow="1" bandRow="1">
-                <a:tableStyleId>{4C3C2611-4C71-4FC5-86AE-919BDF0F9419}</a:tableStyleId>
+                <a:tableStyleId>{B301B821-A1FF-4177-AEE7-76D212191A09}</a:tableStyleId>
               </a:tblPr>
               <a:tblGrid>
-                <a:gridCol w="1729575"/>
-                <a:gridCol w="2440360"/>
-                <a:gridCol w="2262663"/>
-                <a:gridCol w="1954657"/>
+                <a:gridCol w="1495046"/>
+                <a:gridCol w="2411522"/>
+                <a:gridCol w="2183010"/>
+                <a:gridCol w="1723558"/>
               </a:tblGrid>
-              <a:tr h="584944">
+              <a:tr h="245649">
                 <a:tc>
                   <a:txBody>
                     <a:bodyPr/>
                     <a:lstStyle/>
                     <a:p>
-                      <a:pPr lvl="0" algn="l">
+                      <a:pPr algn="l">
                         <a:lnSpc>
                           <a:spcPct val="115000"/>
                         </a:lnSpc>
-                        <a:defRPr sz="1800" b="0" i="0">
-                          <a:solidFill>
-                            <a:srgbClr val="000000"/>
-                          </a:solidFill>
-                        </a:defRPr>
+                        <a:spcAft>
+                          <a:spcPts val="0"/>
+                        </a:spcAft>
                       </a:pPr>
                       <a:r>
-                        <a:rPr sz="1100" b="1">
-                          <a:solidFill>
-                            <a:srgbClr val="FFFFFF"/>
-                          </a:solidFill>
-                          <a:latin typeface="Calibri"/>
-                          <a:ea typeface="Calibri"/>
-                          <a:cs typeface="Calibri"/>
-                          <a:sym typeface="Calibri"/>
+                        <a:rPr lang="de-CH" sz="900" dirty="0">
+                          <a:effectLst/>
                         </a:rPr>
                         <a:t>Aktivitäten</a:t>
                       </a:r>
+                      <a:endParaRPr lang="en-GB" sz="900" dirty="0">
+                        <a:effectLst/>
+                        <a:latin typeface="Calibri"/>
+                        <a:ea typeface="Calibri"/>
+                        <a:cs typeface="Times New Roman"/>
+                      </a:endParaRPr>
                     </a:p>
                   </a:txBody>
-                  <a:tcPr marL="45720" marR="45720" horzOverflow="overflow"/>
+                  <a:tcPr marL="71659" marR="71659" marT="35830" marB="35830"/>
                 </a:tc>
                 <a:tc>
                   <a:txBody>
                     <a:bodyPr/>
                     <a:lstStyle/>
                     <a:p>
-                      <a:pPr lvl="0" algn="l">
+                      <a:pPr algn="l">
                         <a:lnSpc>
                           <a:spcPct val="115000"/>
                         </a:lnSpc>
-                        <a:defRPr sz="1800" b="0" i="0">
-                          <a:solidFill>
-                            <a:srgbClr val="000000"/>
-                          </a:solidFill>
-                        </a:defRPr>
+                        <a:spcAft>
+                          <a:spcPts val="0"/>
+                        </a:spcAft>
                       </a:pPr>
                       <a:r>
-                        <a:rPr sz="1100" b="1">
-                          <a:solidFill>
-                            <a:srgbClr val="FFFFFF"/>
-                          </a:solidFill>
-                          <a:latin typeface="Calibri"/>
-                          <a:ea typeface="Calibri"/>
-                          <a:cs typeface="Calibri"/>
-                          <a:sym typeface="Calibri"/>
+                        <a:rPr lang="de-CH" sz="900">
+                          <a:effectLst/>
                         </a:rPr>
                         <a:t>Ziel</a:t>
                       </a:r>
+                      <a:endParaRPr lang="en-GB" sz="900">
+                        <a:effectLst/>
+                        <a:latin typeface="Calibri"/>
+                        <a:ea typeface="Calibri"/>
+                        <a:cs typeface="Times New Roman"/>
+                      </a:endParaRPr>
                     </a:p>
                   </a:txBody>
-                  <a:tcPr marL="45720" marR="45720" horzOverflow="overflow"/>
+                  <a:tcPr marL="71659" marR="71659" marT="35830" marB="35830"/>
                 </a:tc>
                 <a:tc>
                   <a:txBody>
                     <a:bodyPr/>
                     <a:lstStyle/>
                     <a:p>
-                      <a:pPr lvl="0" algn="l">
+                      <a:pPr algn="l">
                         <a:lnSpc>
                           <a:spcPct val="115000"/>
                         </a:lnSpc>
-                        <a:defRPr sz="1800" b="0" i="0">
-                          <a:solidFill>
-                            <a:srgbClr val="000000"/>
-                          </a:solidFill>
-                        </a:defRPr>
+                        <a:spcAft>
+                          <a:spcPts val="0"/>
+                        </a:spcAft>
                       </a:pPr>
                       <a:r>
-                        <a:rPr sz="1100" b="1">
-                          <a:solidFill>
-                            <a:srgbClr val="FFFFFF"/>
-                          </a:solidFill>
-                          <a:latin typeface="Calibri"/>
-                          <a:ea typeface="Calibri"/>
-                          <a:cs typeface="Calibri"/>
-                          <a:sym typeface="Calibri"/>
+                        <a:rPr lang="de-CH" sz="900">
+                          <a:effectLst/>
                         </a:rPr>
                         <a:t>Aufgabe</a:t>
                       </a:r>
+                      <a:endParaRPr lang="en-GB" sz="900">
+                        <a:effectLst/>
+                        <a:latin typeface="Calibri"/>
+                        <a:ea typeface="Calibri"/>
+                        <a:cs typeface="Times New Roman"/>
+                      </a:endParaRPr>
                     </a:p>
                   </a:txBody>
-                  <a:tcPr marL="45720" marR="45720" horzOverflow="overflow"/>
+                  <a:tcPr marL="71659" marR="71659" marT="35830" marB="35830"/>
                 </a:tc>
                 <a:tc>
                   <a:txBody>
                     <a:bodyPr/>
                     <a:lstStyle/>
                     <a:p>
-                      <a:pPr lvl="0" algn="l">
+                      <a:pPr algn="l">
                         <a:lnSpc>
                           <a:spcPct val="115000"/>
                         </a:lnSpc>
-                        <a:defRPr sz="1800" b="0" i="0">
-                          <a:solidFill>
-                            <a:srgbClr val="000000"/>
-                          </a:solidFill>
-                        </a:defRPr>
+                        <a:spcAft>
+                          <a:spcPts val="0"/>
+                        </a:spcAft>
                       </a:pPr>
                       <a:r>
-                        <a:rPr sz="1100" b="1">
-                          <a:solidFill>
-                            <a:srgbClr val="FFFFFF"/>
-                          </a:solidFill>
-                          <a:latin typeface="Calibri"/>
-                          <a:ea typeface="Calibri"/>
-                          <a:cs typeface="Calibri"/>
-                          <a:sym typeface="Calibri"/>
+                        <a:rPr lang="de-CH" sz="900">
+                          <a:effectLst/>
                         </a:rPr>
                         <a:t>Resultat</a:t>
                       </a:r>
+                      <a:endParaRPr lang="en-GB" sz="900">
+                        <a:effectLst/>
+                        <a:latin typeface="Calibri"/>
+                        <a:ea typeface="Calibri"/>
+                        <a:cs typeface="Times New Roman"/>
+                      </a:endParaRPr>
                     </a:p>
                   </a:txBody>
-                  <a:tcPr marL="45720" marR="45720" horzOverflow="overflow"/>
+                  <a:tcPr marL="71659" marR="71659" marT="35830" marB="35830"/>
                 </a:tc>
               </a:tr>
-              <a:tr h="584944">
+              <a:tr h="909292">
                 <a:tc>
                   <a:txBody>
                     <a:bodyPr/>
                     <a:lstStyle/>
                     <a:p>
-                      <a:pPr lvl="0" algn="l">
+                      <a:pPr algn="l">
                         <a:lnSpc>
                           <a:spcPct val="115000"/>
                         </a:lnSpc>
-                        <a:defRPr sz="1800" b="0" i="0"/>
+                        <a:spcAft>
+                          <a:spcPts val="0"/>
+                        </a:spcAft>
                       </a:pPr>
                       <a:r>
-                        <a:rPr sz="1100" b="1" i="1">
-                          <a:latin typeface="Calibri"/>
-                          <a:ea typeface="Calibri"/>
-                          <a:cs typeface="Calibri"/>
-                          <a:sym typeface="Calibri"/>
+                        <a:rPr lang="de-CH" sz="900">
+                          <a:effectLst/>
                         </a:rPr>
                         <a:t>Spezifikation</a:t>
                       </a:r>
+                      <a:endParaRPr lang="en-GB" sz="900">
+                        <a:effectLst/>
+                        <a:latin typeface="Calibri"/>
+                        <a:ea typeface="Calibri"/>
+                        <a:cs typeface="Times New Roman"/>
+                      </a:endParaRPr>
                     </a:p>
                   </a:txBody>
-                  <a:tcPr marL="45720" marR="45720" horzOverflow="overflow">
-                    <a:solidFill>
-                      <a:srgbClr val="D1DFCD"/>
-                    </a:solidFill>
-                  </a:tcPr>
+                  <a:tcPr marL="71659" marR="71659" marT="35830" marB="35830"/>
                 </a:tc>
                 <a:tc>
                   <a:txBody>
                     <a:bodyPr/>
                     <a:lstStyle/>
                     <a:p>
-                      <a:pPr marL="209550" lvl="0" indent="-209550" algn="l">
+                      <a:pPr marL="342900" lvl="0" indent="-342900" algn="l">
                         <a:lnSpc>
                           <a:spcPct val="115000"/>
                         </a:lnSpc>
-                        <a:buSzPct val="100000"/>
+                        <a:spcAft>
+                          <a:spcPts val="0"/>
+                        </a:spcAft>
                         <a:buFont typeface="Symbol"/>
-                        <a:buChar char="•"/>
-                        <a:defRPr sz="1800" b="0" i="0"/>
+                        <a:buChar char=""/>
                       </a:pPr>
                       <a:r>
-                        <a:rPr sz="1100" b="1" i="1">
-                          <a:latin typeface="Calibri"/>
-                          <a:ea typeface="Calibri"/>
-                          <a:cs typeface="Calibri"/>
-                          <a:sym typeface="Calibri"/>
+                        <a:rPr lang="de-CH" sz="900">
+                          <a:effectLst/>
                         </a:rPr>
-                        <a:t>Anforderungen </a:t>
+                        <a:t>Anforderungen Definiert</a:t>
                       </a:r>
-                      <a:r>
-                        <a:rPr lang="de-CH" sz="1100" b="1" i="1" dirty="0" smtClean="0">
-                          <a:latin typeface="Calibri"/>
-                          <a:ea typeface="Calibri"/>
-                          <a:cs typeface="Calibri"/>
-                          <a:sym typeface="Calibri"/>
-                        </a:rPr>
-                        <a:t>d</a:t>
-                      </a:r>
-                      <a:r>
-                        <a:rPr sz="1100" b="1" i="1" smtClean="0">
-                          <a:latin typeface="Calibri"/>
-                          <a:ea typeface="Calibri"/>
-                          <a:cs typeface="Calibri"/>
-                          <a:sym typeface="Calibri"/>
-                        </a:rPr>
-                        <a:t>efiniert</a:t>
-                      </a:r>
-                      <a:endParaRPr sz="1100" b="1" i="1">
-                        <a:latin typeface="Calibri"/>
-                        <a:ea typeface="Calibri"/>
-                        <a:cs typeface="Calibri"/>
-                        <a:sym typeface="Calibri"/>
+                      <a:endParaRPr lang="en-GB" sz="900">
+                        <a:effectLst/>
                       </a:endParaRPr>
                     </a:p>
                     <a:p>
-                      <a:pPr marL="209550" lvl="0" indent="-209550" algn="l">
+                      <a:pPr marL="342900" lvl="0" indent="-342900" algn="l">
                         <a:lnSpc>
                           <a:spcPct val="115000"/>
                         </a:lnSpc>
-                        <a:buSzPct val="100000"/>
+                        <a:spcAft>
+                          <a:spcPts val="0"/>
+                        </a:spcAft>
                         <a:buFont typeface="Symbol"/>
-                        <a:buChar char="•"/>
-                        <a:defRPr sz="1800" b="0" i="0"/>
+                        <a:buChar char=""/>
                       </a:pPr>
                       <a:r>
-                        <a:rPr sz="1100" b="1" i="1" smtClean="0">
-                          <a:latin typeface="Calibri"/>
-                          <a:ea typeface="Calibri"/>
-                          <a:cs typeface="Calibri"/>
-                          <a:sym typeface="Calibri"/>
+                        <a:rPr lang="de-CH" sz="900">
+                          <a:effectLst/>
                         </a:rPr>
-                        <a:t>Rahmenlanung</a:t>
+                        <a:t>Rahmen Planung</a:t>
                       </a:r>
-                      <a:endParaRPr sz="1100" b="1" i="1">
-                        <a:latin typeface="Calibri"/>
-                        <a:ea typeface="Calibri"/>
-                        <a:cs typeface="Calibri"/>
-                        <a:sym typeface="Calibri"/>
+                      <a:endParaRPr lang="en-GB" sz="900">
+                        <a:effectLst/>
                       </a:endParaRPr>
                     </a:p>
                     <a:p>
-                      <a:pPr marL="209550" lvl="0" indent="-209550" algn="l">
+                      <a:pPr marL="342900" lvl="0" indent="-342900" algn="l">
                         <a:lnSpc>
                           <a:spcPct val="115000"/>
                         </a:lnSpc>
-                        <a:buSzPct val="100000"/>
+                        <a:spcAft>
+                          <a:spcPts val="0"/>
+                        </a:spcAft>
                         <a:buFont typeface="Symbol"/>
-                        <a:buChar char="•"/>
-                        <a:defRPr sz="1800" b="0" i="0"/>
+                        <a:buChar char=""/>
                       </a:pPr>
                       <a:r>
-                        <a:rPr sz="1100" b="1" i="1">
-                          <a:latin typeface="Calibri"/>
-                          <a:ea typeface="Calibri"/>
-                          <a:cs typeface="Calibri"/>
-                          <a:sym typeface="Calibri"/>
+                        <a:rPr lang="de-CH" sz="900">
+                          <a:effectLst/>
                         </a:rPr>
                         <a:t>Wichtige Entscheidungen getroffen</a:t>
                       </a:r>
+                      <a:endParaRPr lang="en-GB" sz="900">
+                        <a:effectLst/>
+                        <a:latin typeface="Calibri"/>
+                        <a:ea typeface="Calibri"/>
+                        <a:cs typeface="Times New Roman"/>
+                      </a:endParaRPr>
                     </a:p>
                   </a:txBody>
-                  <a:tcPr marL="45720" marR="45720" horzOverflow="overflow">
-                    <a:solidFill>
-                      <a:srgbClr val="D1DFCD"/>
-                    </a:solidFill>
-                  </a:tcPr>
+                  <a:tcPr marL="71659" marR="71659" marT="35830" marB="35830"/>
                 </a:tc>
                 <a:tc>
                   <a:txBody>
                     <a:bodyPr/>
                     <a:lstStyle/>
                     <a:p>
-                      <a:pPr marL="209550" lvl="0" indent="-209550" algn="l">
+                      <a:pPr marL="342900" lvl="0" indent="-342900" algn="l">
                         <a:lnSpc>
                           <a:spcPct val="115000"/>
                         </a:lnSpc>
-                        <a:buSzPct val="100000"/>
+                        <a:spcAft>
+                          <a:spcPts val="0"/>
+                        </a:spcAft>
                         <a:buFont typeface="Symbol"/>
-                        <a:buChar char="•"/>
-                        <a:defRPr sz="1800" b="0" i="0"/>
+                        <a:buChar char=""/>
                       </a:pPr>
                       <a:r>
-                        <a:rPr sz="1100" b="1" i="1">
-                          <a:latin typeface="Calibri"/>
-                          <a:ea typeface="Calibri"/>
-                          <a:cs typeface="Calibri"/>
-                          <a:sym typeface="Calibri"/>
+                        <a:rPr lang="de-CH" sz="900">
+                          <a:effectLst/>
                         </a:rPr>
                         <a:t>Entscheidung treffen</a:t>
                       </a:r>
+                      <a:endParaRPr lang="en-GB" sz="900">
+                        <a:effectLst/>
+                      </a:endParaRPr>
                     </a:p>
                     <a:p>
-                      <a:pPr marL="209550" lvl="0" indent="-209550" algn="l">
+                      <a:pPr marL="342900" lvl="0" indent="-342900" algn="l">
                         <a:lnSpc>
                           <a:spcPct val="115000"/>
                         </a:lnSpc>
-                        <a:buSzPct val="100000"/>
+                        <a:spcAft>
+                          <a:spcPts val="0"/>
+                        </a:spcAft>
                         <a:buFont typeface="Symbol"/>
-                        <a:buChar char="•"/>
-                        <a:defRPr sz="1800" b="0" i="0"/>
+                        <a:buChar char=""/>
                       </a:pPr>
                       <a:r>
-                        <a:rPr sz="1100" b="1" i="1">
-                          <a:latin typeface="Calibri"/>
-                          <a:ea typeface="Calibri"/>
-                          <a:cs typeface="Calibri"/>
-                          <a:sym typeface="Calibri"/>
+                        <a:rPr lang="de-CH" sz="900">
+                          <a:effectLst/>
                         </a:rPr>
                         <a:t>Prioritäten definieren</a:t>
                       </a:r>
+                      <a:endParaRPr lang="en-GB" sz="900">
+                        <a:effectLst/>
+                      </a:endParaRPr>
                     </a:p>
                     <a:p>
-                      <a:pPr marL="209550" lvl="0" indent="-209550" algn="l">
+                      <a:pPr marL="342900" lvl="0" indent="-342900" algn="l">
                         <a:lnSpc>
                           <a:spcPct val="115000"/>
                         </a:lnSpc>
-                        <a:buSzPct val="100000"/>
+                        <a:spcAft>
+                          <a:spcPts val="0"/>
+                        </a:spcAft>
                         <a:buFont typeface="Symbol"/>
-                        <a:buChar char="•"/>
-                        <a:defRPr sz="1800" b="0" i="0"/>
+                        <a:buChar char=""/>
                       </a:pPr>
                       <a:r>
-                        <a:rPr sz="1100" b="1" i="1">
-                          <a:latin typeface="Calibri"/>
-                          <a:ea typeface="Calibri"/>
-                          <a:cs typeface="Calibri"/>
-                          <a:sym typeface="Calibri"/>
+                        <a:rPr lang="de-CH" sz="900">
+                          <a:effectLst/>
                         </a:rPr>
                         <a:t>Planen</a:t>
                       </a:r>
+                      <a:endParaRPr lang="en-GB" sz="900">
+                        <a:effectLst/>
+                        <a:latin typeface="Calibri"/>
+                        <a:ea typeface="Calibri"/>
+                        <a:cs typeface="Times New Roman"/>
+                      </a:endParaRPr>
                     </a:p>
                   </a:txBody>
-                  <a:tcPr marL="45720" marR="45720" horzOverflow="overflow">
-                    <a:solidFill>
-                      <a:srgbClr val="D1DFCD"/>
-                    </a:solidFill>
-                  </a:tcPr>
+                  <a:tcPr marL="71659" marR="71659" marT="35830" marB="35830"/>
                 </a:tc>
                 <a:tc>
                   <a:txBody>
                     <a:bodyPr/>
                     <a:lstStyle/>
                     <a:p>
-                      <a:pPr lvl="0" algn="l">
+                      <a:pPr algn="l">
                         <a:lnSpc>
                           <a:spcPct val="115000"/>
                         </a:lnSpc>
-                        <a:defRPr sz="1800" b="0" i="0"/>
+                        <a:spcAft>
+                          <a:spcPts val="0"/>
+                        </a:spcAft>
                       </a:pPr>
                       <a:r>
-                        <a:rPr sz="1100" b="1" i="1">
-                          <a:latin typeface="Calibri"/>
-                          <a:ea typeface="Calibri"/>
-                          <a:cs typeface="Calibri"/>
-                          <a:sym typeface="Calibri"/>
+                        <a:rPr lang="de-CH" sz="900">
+                          <a:effectLst/>
                         </a:rPr>
-                        <a:t>Dokumentation und grobe </a:t>
+                        <a:t>Dokumentation und grobe gesamt Planung</a:t>
                       </a:r>
-                      <a:r>
-                        <a:rPr lang="de-CH" sz="1100" b="1" i="1" dirty="0" smtClean="0">
-                          <a:latin typeface="Calibri"/>
-                          <a:ea typeface="Calibri"/>
-                          <a:cs typeface="Calibri"/>
-                          <a:sym typeface="Calibri"/>
-                        </a:rPr>
-                        <a:t>G</a:t>
-                      </a:r>
-                      <a:r>
-                        <a:rPr sz="1100" b="1" i="1" smtClean="0">
-                          <a:latin typeface="Calibri"/>
-                          <a:ea typeface="Calibri"/>
-                          <a:cs typeface="Calibri"/>
-                          <a:sym typeface="Calibri"/>
-                        </a:rPr>
-                        <a:t>esamtl</a:t>
-                      </a:r>
-                      <a:r>
-                        <a:rPr lang="de-CH" sz="1100" b="1" i="1" dirty="0" err="1" smtClean="0">
-                          <a:latin typeface="Calibri"/>
-                          <a:ea typeface="Calibri"/>
-                          <a:cs typeface="Calibri"/>
-                          <a:sym typeface="Calibri"/>
-                        </a:rPr>
-                        <a:t>pl</a:t>
-                      </a:r>
-                      <a:r>
-                        <a:rPr sz="1100" b="1" i="1" smtClean="0">
-                          <a:latin typeface="Calibri"/>
-                          <a:ea typeface="Calibri"/>
-                          <a:cs typeface="Calibri"/>
-                          <a:sym typeface="Calibri"/>
-                        </a:rPr>
-                        <a:t>anung</a:t>
-                      </a:r>
-                      <a:endParaRPr sz="1100" b="1" i="1">
+                      <a:endParaRPr lang="en-GB" sz="900">
+                        <a:effectLst/>
                         <a:latin typeface="Calibri"/>
                         <a:ea typeface="Calibri"/>
-                        <a:cs typeface="Calibri"/>
-                        <a:sym typeface="Calibri"/>
+                        <a:cs typeface="Times New Roman"/>
                       </a:endParaRPr>
                     </a:p>
                   </a:txBody>
-                  <a:tcPr marL="45720" marR="45720" horzOverflow="overflow">
-                    <a:solidFill>
-                      <a:srgbClr val="D1DFCD"/>
-                    </a:solidFill>
-                  </a:tcPr>
+                  <a:tcPr marL="71659" marR="71659" marT="35830" marB="35830"/>
                 </a:tc>
               </a:tr>
-              <a:tr h="304405">
+              <a:tr h="245649">
                 <a:tc gridSpan="4">
                   <a:txBody>
                     <a:bodyPr/>
                     <a:lstStyle/>
                     <a:p>
-                      <a:pPr lvl="0" algn="ctr">
+                      <a:pPr algn="ctr">
                         <a:lnSpc>
                           <a:spcPct val="115000"/>
                         </a:lnSpc>
-                        <a:defRPr sz="1800" b="0" i="0"/>
+                        <a:spcAft>
+                          <a:spcPts val="0"/>
+                        </a:spcAft>
                       </a:pPr>
                       <a:r>
-                        <a:rPr sz="1100" b="1" i="1">
-                          <a:latin typeface="Calibri"/>
-                          <a:ea typeface="Calibri"/>
-                          <a:cs typeface="Calibri"/>
-                          <a:sym typeface="Calibri"/>
+                        <a:rPr lang="de-CH" sz="900" dirty="0">
+                          <a:effectLst/>
                         </a:rPr>
                         <a:t>Start Iteration(en)</a:t>
                       </a:r>
+                      <a:endParaRPr lang="en-GB" sz="900" dirty="0">
+                        <a:effectLst/>
+                        <a:latin typeface="Calibri"/>
+                        <a:ea typeface="Calibri"/>
+                        <a:cs typeface="Times New Roman"/>
+                      </a:endParaRPr>
                     </a:p>
                   </a:txBody>
-                  <a:tcPr marL="45720" marR="45720" anchor="ctr" horzOverflow="overflow"/>
+                  <a:tcPr marL="71659" marR="71659" marT="35830" marB="35830" anchor="ctr"/>
                 </a:tc>
                 <a:tc hMerge="1">
                   <a:txBody>
                     <a:bodyPr/>
                     <a:lstStyle/>
                     <a:p>
-                      <a:endParaRPr lang="de-DE"/>
+                      <a:endParaRPr lang="de-CH"/>
                     </a:p>
                   </a:txBody>
                   <a:tcPr/>
@@ -5365,7 +5301,7 @@
                     <a:bodyPr/>
                     <a:lstStyle/>
                     <a:p>
-                      <a:endParaRPr lang="de-DE"/>
+                      <a:endParaRPr lang="de-CH"/>
                     </a:p>
                   </a:txBody>
                   <a:tcPr/>
@@ -5375,821 +5311,796 @@
                     <a:bodyPr/>
                     <a:lstStyle/>
                     <a:p>
-                      <a:endParaRPr lang="de-DE"/>
+                      <a:endParaRPr lang="de-CH"/>
                     </a:p>
                   </a:txBody>
                   <a:tcPr/>
                 </a:tc>
               </a:tr>
-              <a:tr h="981326">
+              <a:tr h="766990">
                 <a:tc>
                   <a:txBody>
                     <a:bodyPr/>
                     <a:lstStyle/>
                     <a:p>
-                      <a:pPr lvl="0" algn="l">
+                      <a:pPr algn="l">
                         <a:lnSpc>
                           <a:spcPct val="115000"/>
                         </a:lnSpc>
-                        <a:defRPr sz="1800" b="0" i="0"/>
+                        <a:spcAft>
+                          <a:spcPts val="0"/>
+                        </a:spcAft>
                       </a:pPr>
                       <a:r>
-                        <a:rPr sz="1100" b="1" i="1">
-                          <a:latin typeface="Calibri"/>
-                          <a:ea typeface="Calibri"/>
-                          <a:cs typeface="Calibri"/>
-                          <a:sym typeface="Calibri"/>
+                        <a:rPr lang="en-GB" sz="900">
+                          <a:effectLst/>
                         </a:rPr>
-                        <a:t>User Stories auswählen</a:t>
+                        <a:t>User Stories </a:t>
                       </a:r>
+                      <a:r>
+                        <a:rPr lang="de-CH" sz="900">
+                          <a:effectLst/>
+                        </a:rPr>
+                        <a:t>auswählen</a:t>
+                      </a:r>
+                      <a:endParaRPr lang="en-GB" sz="900">
+                        <a:effectLst/>
+                        <a:latin typeface="Calibri"/>
+                        <a:ea typeface="Calibri"/>
+                        <a:cs typeface="Times New Roman"/>
+                      </a:endParaRPr>
                     </a:p>
                   </a:txBody>
-                  <a:tcPr marL="45720" marR="45720" horzOverflow="overflow"/>
+                  <a:tcPr marL="71659" marR="71659" marT="35830" marB="35830"/>
                 </a:tc>
                 <a:tc>
                   <a:txBody>
                     <a:bodyPr/>
                     <a:lstStyle/>
                     <a:p>
-                      <a:pPr marL="209550" lvl="0" indent="-209550" algn="l">
+                      <a:pPr marL="342900" lvl="0" indent="-342900" algn="l">
                         <a:lnSpc>
                           <a:spcPct val="115000"/>
                         </a:lnSpc>
-                        <a:buSzPct val="100000"/>
+                        <a:spcAft>
+                          <a:spcPts val="0"/>
+                        </a:spcAft>
                         <a:buFont typeface="Symbol"/>
-                        <a:buChar char="•"/>
-                        <a:defRPr sz="1800" b="0" i="0"/>
+                        <a:buChar char=""/>
                       </a:pPr>
                       <a:r>
-                        <a:rPr sz="1100" b="1" i="1">
-                          <a:latin typeface="Calibri"/>
-                          <a:ea typeface="Calibri"/>
-                          <a:cs typeface="Calibri"/>
-                          <a:sym typeface="Calibri"/>
+                        <a:rPr lang="en-GB" sz="900">
+                          <a:effectLst/>
                         </a:rPr>
                         <a:t>Iteration </a:t>
                       </a:r>
                       <a:r>
-                        <a:rPr lang="de-CH" sz="1100" b="1" i="1" dirty="0" smtClean="0">
-                          <a:latin typeface="Calibri"/>
-                          <a:ea typeface="Calibri"/>
-                          <a:cs typeface="Calibri"/>
-                          <a:sym typeface="Calibri"/>
+                        <a:rPr lang="de-CH" sz="900">
+                          <a:effectLst/>
                         </a:rPr>
-                        <a:t>d</a:t>
+                        <a:t>Definiert</a:t>
                       </a:r>
-                      <a:r>
-                        <a:rPr sz="1100" b="1" i="1" smtClean="0">
-                          <a:latin typeface="Calibri"/>
-                          <a:ea typeface="Calibri"/>
-                          <a:cs typeface="Calibri"/>
-                          <a:sym typeface="Calibri"/>
-                        </a:rPr>
-                        <a:t>efiniert</a:t>
-                      </a:r>
-                      <a:endParaRPr sz="1100" b="1" i="1">
-                        <a:latin typeface="Calibri"/>
-                        <a:ea typeface="Calibri"/>
-                        <a:cs typeface="Calibri"/>
-                        <a:sym typeface="Calibri"/>
+                      <a:endParaRPr lang="en-GB" sz="900">
+                        <a:effectLst/>
                       </a:endParaRPr>
                     </a:p>
                     <a:p>
-                      <a:pPr marL="209550" lvl="0" indent="-209550" algn="l">
+                      <a:pPr marL="342900" lvl="0" indent="-342900" algn="l">
                         <a:lnSpc>
                           <a:spcPct val="115000"/>
                         </a:lnSpc>
-                        <a:buSzPct val="100000"/>
+                        <a:spcAft>
+                          <a:spcPts val="0"/>
+                        </a:spcAft>
                         <a:buFont typeface="Symbol"/>
-                        <a:buChar char="•"/>
-                        <a:defRPr sz="1800" b="0" i="0"/>
+                        <a:buChar char=""/>
                       </a:pPr>
                       <a:r>
-                        <a:rPr sz="1100" b="1" i="1">
-                          <a:latin typeface="Calibri"/>
-                          <a:ea typeface="Calibri"/>
-                          <a:cs typeface="Calibri"/>
-                          <a:sym typeface="Calibri"/>
+                        <a:rPr lang="de-CH" sz="900">
+                          <a:effectLst/>
                         </a:rPr>
                         <a:t>Planung der Iteration</a:t>
                       </a:r>
+                      <a:endParaRPr lang="en-GB" sz="900">
+                        <a:effectLst/>
+                        <a:latin typeface="Calibri"/>
+                        <a:ea typeface="Calibri"/>
+                        <a:cs typeface="Times New Roman"/>
+                      </a:endParaRPr>
                     </a:p>
                   </a:txBody>
-                  <a:tcPr marL="45720" marR="45720" horzOverflow="overflow"/>
+                  <a:tcPr marL="71659" marR="71659" marT="35830" marB="35830"/>
                 </a:tc>
                 <a:tc>
                   <a:txBody>
                     <a:bodyPr/>
                     <a:lstStyle/>
                     <a:p>
-                      <a:pPr marL="209550" lvl="0" indent="-209550" algn="l">
+                      <a:pPr marL="342900" lvl="0" indent="-342900" algn="l">
                         <a:lnSpc>
                           <a:spcPct val="115000"/>
                         </a:lnSpc>
-                        <a:buSzPct val="100000"/>
+                        <a:spcAft>
+                          <a:spcPts val="0"/>
+                        </a:spcAft>
                         <a:buFont typeface="Symbol"/>
-                        <a:buChar char="•"/>
-                        <a:defRPr sz="1800" b="0" i="0"/>
+                        <a:buChar char=""/>
                       </a:pPr>
                       <a:r>
-                        <a:rPr sz="1100" b="1" i="1">
-                          <a:latin typeface="Calibri"/>
-                          <a:ea typeface="Calibri"/>
-                          <a:cs typeface="Calibri"/>
-                          <a:sym typeface="Calibri"/>
+                        <a:rPr lang="de-CH" sz="900">
+                          <a:effectLst/>
                         </a:rPr>
                         <a:t>Entscheiden</a:t>
                       </a:r>
+                      <a:endParaRPr lang="en-GB" sz="900">
+                        <a:effectLst/>
+                      </a:endParaRPr>
                     </a:p>
                     <a:p>
-                      <a:pPr marL="209550" lvl="0" indent="-209550" algn="l">
+                      <a:pPr marL="342900" lvl="0" indent="-342900" algn="l">
                         <a:lnSpc>
                           <a:spcPct val="115000"/>
                         </a:lnSpc>
-                        <a:buSzPct val="100000"/>
+                        <a:spcAft>
+                          <a:spcPts val="0"/>
+                        </a:spcAft>
                         <a:buFont typeface="Symbol"/>
-                        <a:buChar char="•"/>
-                        <a:defRPr sz="1800" b="0" i="0"/>
+                        <a:buChar char=""/>
                       </a:pPr>
                       <a:r>
-                        <a:rPr sz="1100" b="1" i="1">
-                          <a:latin typeface="Calibri"/>
-                          <a:ea typeface="Calibri"/>
-                          <a:cs typeface="Calibri"/>
-                          <a:sym typeface="Calibri"/>
+                        <a:rPr lang="de-CH" sz="900">
+                          <a:effectLst/>
                         </a:rPr>
                         <a:t>Prioritäten für Iteration definieren</a:t>
                       </a:r>
+                      <a:endParaRPr lang="en-GB" sz="900">
+                        <a:effectLst/>
+                      </a:endParaRPr>
                     </a:p>
                     <a:p>
-                      <a:pPr marL="209550" lvl="0" indent="-209550" algn="l">
+                      <a:pPr marL="342900" lvl="0" indent="-342900" algn="l">
                         <a:lnSpc>
                           <a:spcPct val="115000"/>
                         </a:lnSpc>
-                        <a:buSzPct val="100000"/>
+                        <a:spcAft>
+                          <a:spcPts val="0"/>
+                        </a:spcAft>
                         <a:buFont typeface="Symbol"/>
-                        <a:buChar char="•"/>
-                        <a:defRPr sz="1800" b="0" i="0"/>
+                        <a:buChar char=""/>
                       </a:pPr>
                       <a:r>
-                        <a:rPr sz="1100" b="1" i="1">
-                          <a:latin typeface="Calibri"/>
-                          <a:ea typeface="Calibri"/>
-                          <a:cs typeface="Calibri"/>
-                          <a:sym typeface="Calibri"/>
+                        <a:rPr lang="de-CH" sz="900">
+                          <a:effectLst/>
                         </a:rPr>
                         <a:t>Planen</a:t>
                       </a:r>
+                      <a:endParaRPr lang="en-GB" sz="900">
+                        <a:effectLst/>
+                        <a:latin typeface="Calibri"/>
+                        <a:ea typeface="Calibri"/>
+                        <a:cs typeface="Times New Roman"/>
+                      </a:endParaRPr>
                     </a:p>
                   </a:txBody>
-                  <a:tcPr marL="45720" marR="45720" horzOverflow="overflow"/>
+                  <a:tcPr marL="71659" marR="71659" marT="35830" marB="35830"/>
                 </a:tc>
                 <a:tc>
                   <a:txBody>
                     <a:bodyPr/>
                     <a:lstStyle/>
                     <a:p>
-                      <a:pPr lvl="0" algn="l">
+                      <a:pPr algn="l">
                         <a:lnSpc>
                           <a:spcPct val="115000"/>
                         </a:lnSpc>
-                        <a:defRPr sz="1800" b="0" i="0"/>
+                        <a:spcAft>
+                          <a:spcPts val="0"/>
+                        </a:spcAft>
                       </a:pPr>
                       <a:r>
-                        <a:rPr sz="1100" b="1" i="1">
-                          <a:latin typeface="Calibri"/>
-                          <a:ea typeface="Calibri"/>
-                          <a:cs typeface="Calibri"/>
-                          <a:sym typeface="Calibri"/>
+                        <a:rPr lang="de-CH" sz="900">
+                          <a:effectLst/>
                         </a:rPr>
                         <a:t>Dokumentation und Iterationsplanung</a:t>
                       </a:r>
+                      <a:endParaRPr lang="en-GB" sz="900">
+                        <a:effectLst/>
+                        <a:latin typeface="Calibri"/>
+                        <a:ea typeface="Calibri"/>
+                        <a:cs typeface="Times New Roman"/>
+                      </a:endParaRPr>
                     </a:p>
                   </a:txBody>
-                  <a:tcPr marL="45720" marR="45720" horzOverflow="overflow"/>
+                  <a:tcPr marL="71659" marR="71659" marT="35830" marB="35830"/>
                 </a:tc>
               </a:tr>
-              <a:tr h="981326">
+              <a:tr h="497881">
                 <a:tc>
                   <a:txBody>
                     <a:bodyPr/>
                     <a:lstStyle/>
                     <a:p>
-                      <a:pPr lvl="0" algn="l">
+                      <a:pPr algn="l">
                         <a:lnSpc>
                           <a:spcPct val="115000"/>
                         </a:lnSpc>
-                        <a:defRPr sz="1800" b="0" i="0"/>
+                        <a:spcAft>
+                          <a:spcPts val="0"/>
+                        </a:spcAft>
                       </a:pPr>
                       <a:r>
-                        <a:rPr sz="1100" b="1" i="1">
-                          <a:latin typeface="Calibri"/>
-                          <a:ea typeface="Calibri"/>
-                          <a:cs typeface="Calibri"/>
-                          <a:sym typeface="Calibri"/>
+                        <a:rPr lang="de-CH" sz="900">
+                          <a:effectLst/>
                         </a:rPr>
                         <a:t>Tasks definieren</a:t>
                       </a:r>
+                      <a:endParaRPr lang="en-GB" sz="900">
+                        <a:effectLst/>
+                        <a:latin typeface="Calibri"/>
+                        <a:ea typeface="Calibri"/>
+                        <a:cs typeface="Times New Roman"/>
+                      </a:endParaRPr>
                     </a:p>
                   </a:txBody>
-                  <a:tcPr marL="45720" marR="45720" horzOverflow="overflow"/>
+                  <a:tcPr marL="71659" marR="71659" marT="35830" marB="35830"/>
                 </a:tc>
                 <a:tc>
                   <a:txBody>
                     <a:bodyPr/>
                     <a:lstStyle/>
                     <a:p>
-                      <a:pPr marL="209550" lvl="0" indent="-209550" algn="l">
+                      <a:pPr marL="342900" lvl="0" indent="-342900" algn="l">
                         <a:lnSpc>
                           <a:spcPct val="115000"/>
                         </a:lnSpc>
-                        <a:buSzPct val="100000"/>
+                        <a:spcAft>
+                          <a:spcPts val="0"/>
+                        </a:spcAft>
                         <a:buFont typeface="Symbol"/>
-                        <a:buChar char="•"/>
-                        <a:defRPr sz="1800" b="0" i="0"/>
+                        <a:buChar char=""/>
                       </a:pPr>
                       <a:r>
-                        <a:rPr sz="1100" b="1" i="1">
-                          <a:latin typeface="Calibri"/>
-                          <a:ea typeface="Calibri"/>
-                          <a:cs typeface="Calibri"/>
-                          <a:sym typeface="Calibri"/>
+                        <a:rPr lang="de-CH" sz="900">
+                          <a:effectLst/>
                         </a:rPr>
                         <a:t>Tasks für Iteration</a:t>
                       </a:r>
+                      <a:endParaRPr lang="en-GB" sz="900">
+                        <a:effectLst/>
+                        <a:latin typeface="Calibri"/>
+                        <a:ea typeface="Calibri"/>
+                        <a:cs typeface="Times New Roman"/>
+                      </a:endParaRPr>
                     </a:p>
                   </a:txBody>
-                  <a:tcPr marL="45720" marR="45720" horzOverflow="overflow"/>
+                  <a:tcPr marL="71659" marR="71659" marT="35830" marB="35830"/>
                 </a:tc>
                 <a:tc>
                   <a:txBody>
                     <a:bodyPr/>
                     <a:lstStyle/>
                     <a:p>
-                      <a:pPr marL="209550" lvl="0" indent="-209550" algn="l">
+                      <a:pPr marL="342900" lvl="0" indent="-342900" algn="l">
                         <a:lnSpc>
                           <a:spcPct val="115000"/>
                         </a:lnSpc>
-                        <a:buSzPct val="100000"/>
+                        <a:spcAft>
+                          <a:spcPts val="0"/>
+                        </a:spcAft>
                         <a:buFont typeface="Symbol"/>
-                        <a:buChar char="•"/>
-                        <a:defRPr sz="1800" b="0" i="0"/>
+                        <a:buChar char=""/>
                       </a:pPr>
                       <a:r>
-                        <a:rPr sz="1100" b="1" i="1">
-                          <a:latin typeface="Calibri"/>
-                          <a:ea typeface="Calibri"/>
-                          <a:cs typeface="Calibri"/>
-                          <a:sym typeface="Calibri"/>
+                        <a:rPr lang="de-CH" sz="900">
+                          <a:effectLst/>
                         </a:rPr>
                         <a:t>Tasks erstellen</a:t>
                       </a:r>
+                      <a:endParaRPr lang="en-GB" sz="900">
+                        <a:effectLst/>
+                      </a:endParaRPr>
                     </a:p>
                     <a:p>
-                      <a:pPr marL="209550" lvl="0" indent="-209550" algn="l">
+                      <a:pPr marL="342900" lvl="0" indent="-342900" algn="l">
                         <a:lnSpc>
                           <a:spcPct val="115000"/>
                         </a:lnSpc>
-                        <a:buSzPct val="100000"/>
+                        <a:spcAft>
+                          <a:spcPts val="0"/>
+                        </a:spcAft>
                         <a:buFont typeface="Symbol"/>
-                        <a:buChar char="•"/>
-                        <a:defRPr sz="1800" b="0" i="0"/>
+                        <a:buChar char=""/>
                       </a:pPr>
                       <a:r>
-                        <a:rPr sz="1100" b="1" i="1" smtClean="0">
-                          <a:latin typeface="Calibri"/>
-                          <a:ea typeface="Calibri"/>
-                          <a:cs typeface="Calibri"/>
-                          <a:sym typeface="Calibri"/>
+                        <a:rPr lang="de-CH" sz="900">
+                          <a:effectLst/>
                         </a:rPr>
-                        <a:t>Prioritäten </a:t>
+                        <a:t>Prioritäten festlegen</a:t>
                       </a:r>
-                      <a:r>
-                        <a:rPr sz="1100" b="1" i="1">
-                          <a:latin typeface="Calibri"/>
-                          <a:ea typeface="Calibri"/>
-                          <a:cs typeface="Calibri"/>
-                          <a:sym typeface="Calibri"/>
-                        </a:rPr>
-                        <a:t>festlegen</a:t>
-                      </a:r>
+                      <a:endParaRPr lang="en-GB" sz="900">
+                        <a:effectLst/>
+                        <a:latin typeface="Calibri"/>
+                        <a:ea typeface="Calibri"/>
+                        <a:cs typeface="Times New Roman"/>
+                      </a:endParaRPr>
                     </a:p>
                   </a:txBody>
-                  <a:tcPr marL="45720" marR="45720" horzOverflow="overflow"/>
+                  <a:tcPr marL="71659" marR="71659" marT="35830" marB="35830"/>
                 </a:tc>
                 <a:tc>
                   <a:txBody>
                     <a:bodyPr/>
                     <a:lstStyle/>
                     <a:p>
-                      <a:pPr lvl="0" algn="l">
+                      <a:pPr algn="l">
                         <a:lnSpc>
                           <a:spcPct val="115000"/>
                         </a:lnSpc>
-                        <a:defRPr sz="1800" b="0" i="0"/>
+                        <a:spcAft>
+                          <a:spcPts val="0"/>
+                        </a:spcAft>
                       </a:pPr>
                       <a:r>
-                        <a:rPr sz="1100" b="1" i="1">
-                          <a:latin typeface="Calibri"/>
-                          <a:ea typeface="Calibri"/>
-                          <a:cs typeface="Calibri"/>
-                          <a:sym typeface="Calibri"/>
+                        <a:rPr lang="de-CH" sz="900">
+                          <a:effectLst/>
                         </a:rPr>
-                        <a:t>Tasks zu den User </a:t>
+                        <a:t>Tasks zu den User Stories</a:t>
                       </a:r>
-                      <a:r>
-                        <a:rPr sz="1100" b="1" i="1" smtClean="0">
-                          <a:latin typeface="Calibri"/>
-                          <a:ea typeface="Calibri"/>
-                          <a:cs typeface="Calibri"/>
-                          <a:sym typeface="Calibri"/>
-                        </a:rPr>
-                        <a:t>Stories</a:t>
-                      </a:r>
-                      <a:endParaRPr sz="1100" b="1" i="1">
+                      <a:endParaRPr lang="en-GB" sz="900">
+                        <a:effectLst/>
                         <a:latin typeface="Calibri"/>
                         <a:ea typeface="Calibri"/>
-                        <a:cs typeface="Calibri"/>
-                        <a:sym typeface="Calibri"/>
+                        <a:cs typeface="Times New Roman"/>
                       </a:endParaRPr>
                     </a:p>
                   </a:txBody>
-                  <a:tcPr marL="45720" marR="45720" horzOverflow="overflow"/>
+                  <a:tcPr marL="71659" marR="71659" marT="35830" marB="35830"/>
                 </a:tc>
               </a:tr>
-              <a:tr h="584944">
+              <a:tr h="583471">
                 <a:tc>
                   <a:txBody>
                     <a:bodyPr/>
                     <a:lstStyle/>
                     <a:p>
-                      <a:pPr lvl="0" algn="l">
+                      <a:pPr algn="l">
                         <a:lnSpc>
                           <a:spcPct val="115000"/>
                         </a:lnSpc>
-                        <a:defRPr sz="1800" b="0" i="0"/>
+                        <a:spcAft>
+                          <a:spcPts val="0"/>
+                        </a:spcAft>
                       </a:pPr>
                       <a:r>
-                        <a:rPr sz="1100" b="1" i="1">
-                          <a:latin typeface="Calibri"/>
-                          <a:ea typeface="Calibri"/>
-                          <a:cs typeface="Calibri"/>
-                          <a:sym typeface="Calibri"/>
+                        <a:rPr lang="de-CH" sz="900">
+                          <a:effectLst/>
                         </a:rPr>
                         <a:t>Entwicklung</a:t>
                       </a:r>
+                      <a:endParaRPr lang="en-GB" sz="900">
+                        <a:effectLst/>
+                        <a:latin typeface="Calibri"/>
+                        <a:ea typeface="Calibri"/>
+                        <a:cs typeface="Times New Roman"/>
+                      </a:endParaRPr>
                     </a:p>
                   </a:txBody>
-                  <a:tcPr marL="45720" marR="45720" horzOverflow="overflow"/>
+                  <a:tcPr marL="71659" marR="71659" marT="35830" marB="35830"/>
                 </a:tc>
                 <a:tc>
                   <a:txBody>
                     <a:bodyPr/>
                     <a:lstStyle/>
                     <a:p>
-                      <a:pPr marL="209550" lvl="0" indent="-209550" algn="l">
+                      <a:pPr marL="342900" lvl="0" indent="-342900" algn="l">
                         <a:lnSpc>
                           <a:spcPct val="115000"/>
                         </a:lnSpc>
-                        <a:buSzPct val="100000"/>
+                        <a:spcAft>
+                          <a:spcPts val="0"/>
+                        </a:spcAft>
                         <a:buFont typeface="Symbol"/>
-                        <a:buChar char="•"/>
-                        <a:defRPr sz="1800" b="0" i="0"/>
+                        <a:buChar char=""/>
                       </a:pPr>
                       <a:r>
-                        <a:rPr sz="1100" b="1" i="1">
-                          <a:latin typeface="Calibri"/>
-                          <a:ea typeface="Calibri"/>
-                          <a:cs typeface="Calibri"/>
-                          <a:sym typeface="Calibri"/>
+                        <a:rPr lang="de-CH" sz="900">
+                          <a:effectLst/>
                         </a:rPr>
-                        <a:t>Software </a:t>
+                        <a:t>Software Implementiert</a:t>
                       </a:r>
-                      <a:r>
-                        <a:rPr lang="de-CH" sz="1100" b="1" i="1" dirty="0" smtClean="0">
-                          <a:latin typeface="Calibri"/>
-                          <a:ea typeface="Calibri"/>
-                          <a:cs typeface="Calibri"/>
-                          <a:sym typeface="Calibri"/>
-                        </a:rPr>
-                        <a:t>i</a:t>
-                      </a:r>
-                      <a:r>
-                        <a:rPr sz="1100" b="1" i="1" smtClean="0">
-                          <a:latin typeface="Calibri"/>
-                          <a:ea typeface="Calibri"/>
-                          <a:cs typeface="Calibri"/>
-                          <a:sym typeface="Calibri"/>
-                        </a:rPr>
-                        <a:t>mplementiert</a:t>
-                      </a:r>
-                      <a:endParaRPr sz="1100" b="1" i="1">
+                      <a:endParaRPr lang="en-GB" sz="900">
+                        <a:effectLst/>
                         <a:latin typeface="Calibri"/>
                         <a:ea typeface="Calibri"/>
-                        <a:cs typeface="Calibri"/>
-                        <a:sym typeface="Calibri"/>
+                        <a:cs typeface="Times New Roman"/>
                       </a:endParaRPr>
                     </a:p>
                   </a:txBody>
-                  <a:tcPr marL="45720" marR="45720" horzOverflow="overflow"/>
+                  <a:tcPr marL="71659" marR="71659" marT="35830" marB="35830"/>
                 </a:tc>
                 <a:tc>
                   <a:txBody>
                     <a:bodyPr/>
                     <a:lstStyle/>
                     <a:p>
-                      <a:pPr marL="209550" lvl="0" indent="-209550" algn="l">
+                      <a:pPr marL="342900" lvl="0" indent="-342900" algn="l">
                         <a:lnSpc>
                           <a:spcPct val="115000"/>
                         </a:lnSpc>
-                        <a:buSzPct val="100000"/>
+                        <a:spcAft>
+                          <a:spcPts val="0"/>
+                        </a:spcAft>
                         <a:buFont typeface="Symbol"/>
-                        <a:buChar char="•"/>
-                        <a:defRPr sz="1800" b="0" i="0"/>
+                        <a:buChar char=""/>
                       </a:pPr>
                       <a:r>
-                        <a:rPr sz="1100" b="1" i="1">
-                          <a:latin typeface="Calibri"/>
-                          <a:ea typeface="Calibri"/>
-                          <a:cs typeface="Calibri"/>
-                          <a:sym typeface="Calibri"/>
+                        <a:rPr lang="de-CH" sz="900">
+                          <a:effectLst/>
                         </a:rPr>
                         <a:t>Implementieren der getroffenen Entscheidungen</a:t>
                       </a:r>
+                      <a:endParaRPr lang="en-GB" sz="900">
+                        <a:effectLst/>
+                        <a:latin typeface="Calibri"/>
+                        <a:ea typeface="Calibri"/>
+                        <a:cs typeface="Times New Roman"/>
+                      </a:endParaRPr>
                     </a:p>
                   </a:txBody>
-                  <a:tcPr marL="45720" marR="45720" horzOverflow="overflow"/>
+                  <a:tcPr marL="71659" marR="71659" marT="35830" marB="35830"/>
                 </a:tc>
                 <a:tc>
                   <a:txBody>
                     <a:bodyPr/>
                     <a:lstStyle/>
                     <a:p>
-                      <a:pPr lvl="0" algn="l">
+                      <a:pPr algn="l">
                         <a:lnSpc>
                           <a:spcPct val="115000"/>
                         </a:lnSpc>
-                        <a:defRPr sz="1800" b="0" i="0"/>
+                        <a:spcAft>
+                          <a:spcPts val="0"/>
+                        </a:spcAft>
                       </a:pPr>
                       <a:r>
-                        <a:rPr sz="1100" b="1" i="1">
-                          <a:latin typeface="Calibri"/>
-                          <a:ea typeface="Calibri"/>
-                          <a:cs typeface="Calibri"/>
-                          <a:sym typeface="Calibri"/>
+                        <a:rPr lang="de-CH" sz="900">
+                          <a:effectLst/>
                         </a:rPr>
-                        <a:t>Neue Version des Produkts implementiert</a:t>
+                        <a:t>Neue Version der Software implementiert</a:t>
                       </a:r>
+                      <a:endParaRPr lang="en-GB" sz="900">
+                        <a:effectLst/>
+                        <a:latin typeface="Calibri"/>
+                        <a:ea typeface="Calibri"/>
+                        <a:cs typeface="Times New Roman"/>
+                      </a:endParaRPr>
                     </a:p>
                   </a:txBody>
-                  <a:tcPr marL="45720" marR="45720" horzOverflow="overflow"/>
+                  <a:tcPr marL="71659" marR="71659" marT="35830" marB="35830"/>
                 </a:tc>
               </a:tr>
-              <a:tr h="584944">
+              <a:tr h="624689">
                 <a:tc>
                   <a:txBody>
                     <a:bodyPr/>
                     <a:lstStyle/>
                     <a:p>
-                      <a:pPr lvl="0" algn="l">
+                      <a:pPr algn="l">
                         <a:lnSpc>
                           <a:spcPct val="115000"/>
                         </a:lnSpc>
-                        <a:defRPr sz="1800" b="0" i="0"/>
+                        <a:spcAft>
+                          <a:spcPts val="0"/>
+                        </a:spcAft>
                       </a:pPr>
                       <a:r>
-                        <a:rPr sz="1100" b="1" i="1">
-                          <a:latin typeface="Calibri"/>
-                          <a:ea typeface="Calibri"/>
-                          <a:cs typeface="Calibri"/>
-                          <a:sym typeface="Calibri"/>
+                        <a:rPr lang="de-CH" sz="900">
+                          <a:effectLst/>
                         </a:rPr>
                         <a:t>Test</a:t>
                       </a:r>
+                      <a:endParaRPr lang="en-GB" sz="900">
+                        <a:effectLst/>
+                        <a:latin typeface="Calibri"/>
+                        <a:ea typeface="Calibri"/>
+                        <a:cs typeface="Times New Roman"/>
+                      </a:endParaRPr>
                     </a:p>
                   </a:txBody>
-                  <a:tcPr marL="45720" marR="45720" horzOverflow="overflow"/>
+                  <a:tcPr marL="71659" marR="71659" marT="35830" marB="35830"/>
                 </a:tc>
                 <a:tc>
                   <a:txBody>
                     <a:bodyPr/>
                     <a:lstStyle/>
                     <a:p>
-                      <a:pPr marL="209550" lvl="0" indent="-209550" algn="l">
+                      <a:pPr marL="342900" lvl="0" indent="-342900" algn="l">
                         <a:lnSpc>
                           <a:spcPct val="115000"/>
                         </a:lnSpc>
-                        <a:buSzPct val="100000"/>
+                        <a:spcAft>
+                          <a:spcPts val="0"/>
+                        </a:spcAft>
                         <a:buFont typeface="Symbol"/>
-                        <a:buChar char="•"/>
-                        <a:defRPr sz="1800" b="0" i="0"/>
+                        <a:buChar char=""/>
                       </a:pPr>
                       <a:r>
-                        <a:rPr sz="1100" b="1" i="1">
-                          <a:latin typeface="Calibri"/>
-                          <a:ea typeface="Calibri"/>
-                          <a:cs typeface="Calibri"/>
-                          <a:sym typeface="Calibri"/>
+                        <a:rPr lang="de-CH" sz="900">
+                          <a:effectLst/>
                         </a:rPr>
-                        <a:t>Fehlerfreie </a:t>
+                        <a:t>Fehlerfreie Software Version</a:t>
                       </a:r>
-                      <a:r>
-                        <a:rPr sz="1100" b="1" i="1" smtClean="0">
-                          <a:latin typeface="Calibri"/>
-                          <a:ea typeface="Calibri"/>
-                          <a:cs typeface="Calibri"/>
-                          <a:sym typeface="Calibri"/>
-                        </a:rPr>
-                        <a:t>Software</a:t>
-                      </a:r>
-                      <a:r>
-                        <a:rPr lang="de-CH" sz="1100" b="1" i="1" dirty="0" smtClean="0">
-                          <a:latin typeface="Calibri"/>
-                          <a:ea typeface="Calibri"/>
-                          <a:cs typeface="Calibri"/>
-                          <a:sym typeface="Calibri"/>
-                        </a:rPr>
-                        <a:t>v</a:t>
-                      </a:r>
-                      <a:r>
-                        <a:rPr sz="1100" b="1" i="1" smtClean="0">
-                          <a:latin typeface="Calibri"/>
-                          <a:ea typeface="Calibri"/>
-                          <a:cs typeface="Calibri"/>
-                          <a:sym typeface="Calibri"/>
-                        </a:rPr>
-                        <a:t>ersion</a:t>
-                      </a:r>
-                      <a:endParaRPr sz="1100" b="1" i="1">
+                      <a:endParaRPr lang="en-GB" sz="900">
+                        <a:effectLst/>
                         <a:latin typeface="Calibri"/>
                         <a:ea typeface="Calibri"/>
-                        <a:cs typeface="Calibri"/>
-                        <a:sym typeface="Calibri"/>
+                        <a:cs typeface="Times New Roman"/>
                       </a:endParaRPr>
                     </a:p>
                   </a:txBody>
-                  <a:tcPr marL="45720" marR="45720" horzOverflow="overflow"/>
+                  <a:tcPr marL="71659" marR="71659" marT="35830" marB="35830"/>
                 </a:tc>
                 <a:tc>
                   <a:txBody>
                     <a:bodyPr/>
                     <a:lstStyle/>
                     <a:p>
-                      <a:pPr marL="209550" lvl="0" indent="-209550" algn="l">
+                      <a:pPr marL="342900" lvl="0" indent="-342900" algn="l">
                         <a:lnSpc>
                           <a:spcPct val="115000"/>
                         </a:lnSpc>
-                        <a:buSzPct val="100000"/>
+                        <a:spcAft>
+                          <a:spcPts val="0"/>
+                        </a:spcAft>
                         <a:buFont typeface="Symbol"/>
-                        <a:buChar char="•"/>
-                        <a:defRPr sz="1800" b="0" i="0"/>
+                        <a:buChar char=""/>
                       </a:pPr>
                       <a:r>
-                        <a:rPr sz="1100" b="1" i="1">
-                          <a:latin typeface="Calibri"/>
-                          <a:ea typeface="Calibri"/>
-                          <a:cs typeface="Calibri"/>
-                          <a:sym typeface="Calibri"/>
+                        <a:rPr lang="de-CH" sz="900">
+                          <a:effectLst/>
                         </a:rPr>
                         <a:t>Alle Tests durchführen</a:t>
                       </a:r>
+                      <a:endParaRPr lang="en-GB" sz="900">
+                        <a:effectLst/>
+                      </a:endParaRPr>
                     </a:p>
                     <a:p>
-                      <a:pPr marL="209550" lvl="0" indent="-209550" algn="l">
+                      <a:pPr marL="342900" lvl="0" indent="-342900" algn="l">
                         <a:lnSpc>
                           <a:spcPct val="115000"/>
                         </a:lnSpc>
-                        <a:buSzPct val="100000"/>
+                        <a:spcAft>
+                          <a:spcPts val="0"/>
+                        </a:spcAft>
                         <a:buFont typeface="Symbol"/>
-                        <a:buChar char="•"/>
-                        <a:defRPr sz="1800" b="0" i="0"/>
+                        <a:buChar char=""/>
                       </a:pPr>
                       <a:r>
-                        <a:rPr sz="1100" b="1" i="1">
-                          <a:latin typeface="Calibri"/>
-                          <a:ea typeface="Calibri"/>
-                          <a:cs typeface="Calibri"/>
-                          <a:sym typeface="Calibri"/>
+                        <a:rPr lang="de-CH" sz="900">
+                          <a:effectLst/>
                         </a:rPr>
                         <a:t>Vorhandene Fehler beheben</a:t>
                       </a:r>
+                      <a:endParaRPr lang="en-GB" sz="900">
+                        <a:effectLst/>
+                        <a:latin typeface="Calibri"/>
+                        <a:ea typeface="Calibri"/>
+                        <a:cs typeface="Times New Roman"/>
+                      </a:endParaRPr>
                     </a:p>
                   </a:txBody>
-                  <a:tcPr marL="45720" marR="45720" horzOverflow="overflow"/>
+                  <a:tcPr marL="71659" marR="71659" marT="35830" marB="35830"/>
                 </a:tc>
                 <a:tc>
                   <a:txBody>
                     <a:bodyPr/>
                     <a:lstStyle/>
                     <a:p>
-                      <a:pPr lvl="0" algn="l">
+                      <a:pPr algn="l">
                         <a:lnSpc>
                           <a:spcPct val="115000"/>
                         </a:lnSpc>
-                        <a:defRPr sz="1800" b="0" i="0"/>
+                        <a:spcAft>
+                          <a:spcPts val="0"/>
+                        </a:spcAft>
                       </a:pPr>
                       <a:r>
-                        <a:rPr sz="1100" b="1" i="1">
-                          <a:latin typeface="Calibri"/>
-                          <a:ea typeface="Calibri"/>
-                          <a:cs typeface="Calibri"/>
-                          <a:sym typeface="Calibri"/>
+                        <a:rPr lang="de-CH" sz="900">
+                          <a:effectLst/>
                         </a:rPr>
-                        <a:t>Getestete </a:t>
+                        <a:t>Getestete Software Version</a:t>
                       </a:r>
-                      <a:r>
-                        <a:rPr sz="1100" b="1" i="1" smtClean="0">
-                          <a:latin typeface="Calibri"/>
-                          <a:ea typeface="Calibri"/>
-                          <a:cs typeface="Calibri"/>
-                          <a:sym typeface="Calibri"/>
-                        </a:rPr>
-                        <a:t>Software</a:t>
-                      </a:r>
-                      <a:r>
-                        <a:rPr lang="de-CH" sz="1100" b="1" i="1" dirty="0" smtClean="0">
-                          <a:latin typeface="Calibri"/>
-                          <a:ea typeface="Calibri"/>
-                          <a:cs typeface="Calibri"/>
-                          <a:sym typeface="Calibri"/>
-                        </a:rPr>
-                        <a:t>v</a:t>
-                      </a:r>
-                      <a:r>
-                        <a:rPr sz="1100" b="1" i="1" smtClean="0">
-                          <a:latin typeface="Calibri"/>
-                          <a:ea typeface="Calibri"/>
-                          <a:cs typeface="Calibri"/>
-                          <a:sym typeface="Calibri"/>
-                        </a:rPr>
-                        <a:t>ersion</a:t>
-                      </a:r>
-                      <a:endParaRPr sz="1100" b="1" i="1">
+                      <a:endParaRPr lang="en-GB" sz="900">
+                        <a:effectLst/>
                         <a:latin typeface="Calibri"/>
                         <a:ea typeface="Calibri"/>
-                        <a:cs typeface="Calibri"/>
-                        <a:sym typeface="Calibri"/>
+                        <a:cs typeface="Times New Roman"/>
                       </a:endParaRPr>
                     </a:p>
                   </a:txBody>
-                  <a:tcPr marL="45720" marR="45720" horzOverflow="overflow"/>
+                  <a:tcPr marL="71659" marR="71659" marT="35830" marB="35830"/>
                 </a:tc>
               </a:tr>
-              <a:tr h="584944">
+              <a:tr h="624689">
                 <a:tc>
                   <a:txBody>
                     <a:bodyPr/>
                     <a:lstStyle/>
                     <a:p>
-                      <a:pPr lvl="0" algn="l">
+                      <a:pPr algn="l">
                         <a:lnSpc>
                           <a:spcPct val="115000"/>
                         </a:lnSpc>
-                        <a:defRPr sz="1800" b="0" i="0"/>
+                        <a:spcAft>
+                          <a:spcPts val="0"/>
+                        </a:spcAft>
                       </a:pPr>
                       <a:r>
-                        <a:rPr sz="1100" b="1" i="1">
-                          <a:latin typeface="Calibri"/>
-                          <a:ea typeface="Calibri"/>
-                          <a:cs typeface="Calibri"/>
-                          <a:sym typeface="Calibri"/>
+                        <a:rPr lang="de-CH" sz="900">
+                          <a:effectLst/>
                         </a:rPr>
                         <a:t>Validation</a:t>
                       </a:r>
+                      <a:endParaRPr lang="en-GB" sz="900">
+                        <a:effectLst/>
+                        <a:latin typeface="Calibri"/>
+                        <a:ea typeface="Calibri"/>
+                        <a:cs typeface="Times New Roman"/>
+                      </a:endParaRPr>
                     </a:p>
                   </a:txBody>
-                  <a:tcPr marL="45720" marR="45720" horzOverflow="overflow"/>
+                  <a:tcPr marL="71659" marR="71659" marT="35830" marB="35830"/>
                 </a:tc>
                 <a:tc>
                   <a:txBody>
                     <a:bodyPr/>
                     <a:lstStyle/>
                     <a:p>
-                      <a:pPr marL="209550" lvl="0" indent="-209550" algn="l">
+                      <a:pPr marL="342900" lvl="0" indent="-342900" algn="l">
                         <a:lnSpc>
                           <a:spcPct val="115000"/>
                         </a:lnSpc>
-                        <a:buSzPct val="100000"/>
+                        <a:spcAft>
+                          <a:spcPts val="0"/>
+                        </a:spcAft>
                         <a:buFont typeface="Symbol"/>
-                        <a:buChar char="•"/>
-                        <a:defRPr sz="1800" b="0" i="0"/>
+                        <a:buChar char=""/>
                       </a:pPr>
                       <a:r>
-                        <a:rPr sz="1100" b="1" i="1">
-                          <a:latin typeface="Calibri"/>
-                          <a:ea typeface="Calibri"/>
-                          <a:cs typeface="Calibri"/>
-                          <a:sym typeface="Calibri"/>
+                        <a:rPr lang="de-CH" sz="900">
+                          <a:effectLst/>
                         </a:rPr>
                         <a:t>Software vom Kunden genehmigt</a:t>
                       </a:r>
+                      <a:endParaRPr lang="en-GB" sz="900">
+                        <a:effectLst/>
+                        <a:latin typeface="Calibri"/>
+                        <a:ea typeface="Calibri"/>
+                        <a:cs typeface="Times New Roman"/>
+                      </a:endParaRPr>
                     </a:p>
                   </a:txBody>
-                  <a:tcPr marL="45720" marR="45720" horzOverflow="overflow"/>
+                  <a:tcPr marL="71659" marR="71659" marT="35830" marB="35830"/>
                 </a:tc>
                 <a:tc>
                   <a:txBody>
                     <a:bodyPr/>
                     <a:lstStyle/>
                     <a:p>
-                      <a:pPr marL="209550" lvl="0" indent="-209550" algn="l">
+                      <a:pPr marL="342900" lvl="0" indent="-342900" algn="l">
                         <a:lnSpc>
                           <a:spcPct val="115000"/>
                         </a:lnSpc>
-                        <a:buSzPct val="100000"/>
+                        <a:spcAft>
+                          <a:spcPts val="0"/>
+                        </a:spcAft>
                         <a:buFont typeface="Symbol"/>
-                        <a:buChar char="•"/>
-                        <a:defRPr sz="1800" b="0" i="0"/>
+                        <a:buChar char=""/>
                       </a:pPr>
                       <a:r>
-                        <a:rPr sz="1100" b="1" i="1">
-                          <a:latin typeface="Calibri"/>
-                          <a:ea typeface="Calibri"/>
-                          <a:cs typeface="Calibri"/>
-                          <a:sym typeface="Calibri"/>
+                        <a:rPr lang="de-CH" sz="900">
+                          <a:effectLst/>
                         </a:rPr>
                         <a:t>Absprache mit Kunden</a:t>
                       </a:r>
+                      <a:endParaRPr lang="en-GB" sz="900">
+                        <a:effectLst/>
+                      </a:endParaRPr>
                     </a:p>
                     <a:p>
-                      <a:pPr marL="209550" lvl="0" indent="-209550" algn="l">
+                      <a:pPr marL="342900" lvl="0" indent="-342900" algn="l">
                         <a:lnSpc>
                           <a:spcPct val="115000"/>
                         </a:lnSpc>
-                        <a:buSzPct val="100000"/>
+                        <a:spcAft>
+                          <a:spcPts val="0"/>
+                        </a:spcAft>
                         <a:buFont typeface="Symbol"/>
-                        <a:buChar char="•"/>
-                        <a:defRPr sz="1800" b="0" i="0"/>
+                        <a:buChar char=""/>
                       </a:pPr>
                       <a:r>
-                        <a:rPr sz="1100" b="1" i="1">
-                          <a:latin typeface="Calibri"/>
-                          <a:ea typeface="Calibri"/>
-                          <a:cs typeface="Calibri"/>
-                          <a:sym typeface="Calibri"/>
+                        <a:rPr lang="de-CH" sz="900">
+                          <a:effectLst/>
                         </a:rPr>
                         <a:t>Kleinere Änderungen</a:t>
                       </a:r>
+                      <a:endParaRPr lang="en-GB" sz="900">
+                        <a:effectLst/>
+                        <a:latin typeface="Calibri"/>
+                        <a:ea typeface="Calibri"/>
+                        <a:cs typeface="Times New Roman"/>
+                      </a:endParaRPr>
                     </a:p>
                   </a:txBody>
-                  <a:tcPr marL="45720" marR="45720" horzOverflow="overflow"/>
+                  <a:tcPr marL="71659" marR="71659" marT="35830" marB="35830"/>
                 </a:tc>
                 <a:tc>
                   <a:txBody>
                     <a:bodyPr/>
                     <a:lstStyle/>
                     <a:p>
-                      <a:pPr lvl="0" algn="l">
+                      <a:pPr algn="l">
                         <a:lnSpc>
                           <a:spcPct val="115000"/>
                         </a:lnSpc>
-                        <a:defRPr sz="1800" b="0" i="0"/>
+                        <a:spcAft>
+                          <a:spcPts val="0"/>
+                        </a:spcAft>
                       </a:pPr>
                       <a:r>
-                        <a:rPr sz="1100" b="1" i="1">
-                          <a:latin typeface="Calibri"/>
-                          <a:ea typeface="Calibri"/>
-                          <a:cs typeface="Calibri"/>
-                          <a:sym typeface="Calibri"/>
+                        <a:rPr lang="de-CH" sz="900">
+                          <a:effectLst/>
                         </a:rPr>
-                        <a:t>Validierte Version des Produkts</a:t>
+                        <a:t>Validierte Version der Software</a:t>
                       </a:r>
+                      <a:endParaRPr lang="en-GB" sz="900">
+                        <a:effectLst/>
+                        <a:latin typeface="Calibri"/>
+                        <a:ea typeface="Calibri"/>
+                        <a:cs typeface="Times New Roman"/>
+                      </a:endParaRPr>
                     </a:p>
                   </a:txBody>
-                  <a:tcPr marL="45720" marR="45720" horzOverflow="overflow"/>
+                  <a:tcPr marL="71659" marR="71659" marT="35830" marB="35830"/>
                 </a:tc>
               </a:tr>
-              <a:tr h="266200">
+              <a:tr h="245649">
                 <a:tc gridSpan="4">
                   <a:txBody>
                     <a:bodyPr/>
                     <a:lstStyle/>
                     <a:p>
-                      <a:pPr lvl="0" algn="ctr">
+                      <a:pPr algn="ctr">
                         <a:lnSpc>
                           <a:spcPct val="115000"/>
                         </a:lnSpc>
-                        <a:defRPr sz="1800" b="0" i="0"/>
+                        <a:spcAft>
+                          <a:spcPts val="0"/>
+                        </a:spcAft>
                       </a:pPr>
                       <a:r>
-                        <a:rPr sz="1100" b="1" i="1">
-                          <a:latin typeface="Calibri"/>
-                          <a:ea typeface="Calibri"/>
-                          <a:cs typeface="Calibri"/>
-                          <a:sym typeface="Calibri"/>
+                        <a:rPr lang="de-CH" sz="900" dirty="0">
+                          <a:effectLst/>
                         </a:rPr>
                         <a:t>Nächster Zyklus erforderlich?</a:t>
                       </a:r>
+                      <a:endParaRPr lang="en-GB" sz="900" dirty="0">
+                        <a:effectLst/>
+                        <a:latin typeface="Calibri"/>
+                        <a:ea typeface="Calibri"/>
+                        <a:cs typeface="Times New Roman"/>
+                      </a:endParaRPr>
                     </a:p>
                   </a:txBody>
-                  <a:tcPr marL="45720" marR="45720" anchor="ctr" horzOverflow="overflow"/>
+                  <a:tcPr marL="71659" marR="71659" marT="35830" marB="35830" anchor="ctr"/>
                 </a:tc>
                 <a:tc hMerge="1">
                   <a:txBody>
                     <a:bodyPr/>
                     <a:lstStyle/>
                     <a:p>
-                      <a:endParaRPr lang="de-DE"/>
+                      <a:endParaRPr lang="de-CH"/>
                     </a:p>
                   </a:txBody>
                   <a:tcPr/>
@@ -6199,7 +6110,7 @@
                     <a:bodyPr/>
                     <a:lstStyle/>
                     <a:p>
-                      <a:endParaRPr lang="de-DE"/>
+                      <a:endParaRPr lang="de-CH"/>
                     </a:p>
                   </a:txBody>
                   <a:tcPr/>
@@ -6209,181 +6120,132 @@
                     <a:bodyPr/>
                     <a:lstStyle/>
                     <a:p>
-                      <a:endParaRPr lang="de-DE"/>
+                      <a:endParaRPr lang="de-CH"/>
                     </a:p>
                   </a:txBody>
                   <a:tcPr/>
                 </a:tc>
               </a:tr>
-              <a:tr h="584944">
+              <a:tr h="498330">
                 <a:tc>
                   <a:txBody>
                     <a:bodyPr/>
                     <a:lstStyle/>
                     <a:p>
-                      <a:pPr lvl="0" algn="l">
+                      <a:pPr algn="l">
                         <a:lnSpc>
                           <a:spcPct val="115000"/>
                         </a:lnSpc>
-                        <a:defRPr sz="1800" b="0" i="0"/>
+                        <a:spcAft>
+                          <a:spcPts val="0"/>
+                        </a:spcAft>
                       </a:pPr>
                       <a:r>
-                        <a:rPr sz="1100" b="1" i="1">
-                          <a:latin typeface="Calibri"/>
-                          <a:ea typeface="Calibri"/>
-                          <a:cs typeface="Calibri"/>
-                          <a:sym typeface="Calibri"/>
+                        <a:rPr lang="de-CH" sz="900">
+                          <a:effectLst/>
                         </a:rPr>
                         <a:t>Abschluss</a:t>
                       </a:r>
+                      <a:endParaRPr lang="en-GB" sz="900">
+                        <a:effectLst/>
+                        <a:latin typeface="Calibri"/>
+                        <a:ea typeface="Calibri"/>
+                        <a:cs typeface="Times New Roman"/>
+                      </a:endParaRPr>
                     </a:p>
                   </a:txBody>
-                  <a:tcPr marL="45720" marR="45720" horzOverflow="overflow">
-                    <a:solidFill>
-                      <a:srgbClr val="D1DFCD"/>
-                    </a:solidFill>
-                  </a:tcPr>
+                  <a:tcPr marL="71659" marR="71659" marT="35830" marB="35830"/>
                 </a:tc>
                 <a:tc>
                   <a:txBody>
                     <a:bodyPr/>
                     <a:lstStyle/>
                     <a:p>
-                      <a:pPr marL="209550" lvl="0" indent="-209550" algn="l">
+                      <a:pPr marL="342900" lvl="0" indent="-342900" algn="l">
                         <a:lnSpc>
                           <a:spcPct val="115000"/>
                         </a:lnSpc>
-                        <a:buSzPct val="100000"/>
+                        <a:spcAft>
+                          <a:spcPts val="0"/>
+                        </a:spcAft>
                         <a:buFont typeface="Symbol"/>
-                        <a:buChar char="•"/>
-                        <a:defRPr sz="1800" b="0" i="0"/>
+                        <a:buChar char=""/>
                       </a:pPr>
                       <a:r>
-                        <a:rPr sz="1100" b="1" i="1">
-                          <a:latin typeface="Calibri"/>
-                          <a:ea typeface="Calibri"/>
-                          <a:cs typeface="Calibri"/>
-                          <a:sym typeface="Calibri"/>
+                        <a:rPr lang="de-CH" sz="900">
+                          <a:effectLst/>
                         </a:rPr>
-                        <a:t>Produkt </a:t>
+                        <a:t>Produkt Auslieferbereit und Fehlerfrei</a:t>
                       </a:r>
-                      <a:r>
-                        <a:rPr lang="de-CH" sz="1100" b="1" i="1" dirty="0" smtClean="0">
-                          <a:latin typeface="Calibri"/>
-                          <a:ea typeface="Calibri"/>
-                          <a:cs typeface="Calibri"/>
-                          <a:sym typeface="Calibri"/>
-                        </a:rPr>
-                        <a:t>a</a:t>
-                      </a:r>
-                      <a:r>
-                        <a:rPr sz="1100" b="1" i="1" smtClean="0">
-                          <a:latin typeface="Calibri"/>
-                          <a:ea typeface="Calibri"/>
-                          <a:cs typeface="Calibri"/>
-                          <a:sym typeface="Calibri"/>
-                        </a:rPr>
-                        <a:t>uslieferbereit </a:t>
-                      </a:r>
-                      <a:r>
-                        <a:rPr sz="1100" b="1" i="1">
-                          <a:latin typeface="Calibri"/>
-                          <a:ea typeface="Calibri"/>
-                          <a:cs typeface="Calibri"/>
-                          <a:sym typeface="Calibri"/>
-                        </a:rPr>
-                        <a:t>und </a:t>
-                      </a:r>
-                      <a:r>
-                        <a:rPr lang="de-CH" sz="1100" b="1" i="1" dirty="0" smtClean="0">
-                          <a:latin typeface="Calibri"/>
-                          <a:ea typeface="Calibri"/>
-                          <a:cs typeface="Calibri"/>
-                          <a:sym typeface="Calibri"/>
-                        </a:rPr>
-                        <a:t>f</a:t>
-                      </a:r>
-                      <a:r>
-                        <a:rPr sz="1100" b="1" i="1" smtClean="0">
-                          <a:latin typeface="Calibri"/>
-                          <a:ea typeface="Calibri"/>
-                          <a:cs typeface="Calibri"/>
-                          <a:sym typeface="Calibri"/>
-                        </a:rPr>
-                        <a:t>ehlerfrei</a:t>
-                      </a:r>
-                      <a:endParaRPr sz="1100" b="1" i="1">
+                      <a:endParaRPr lang="en-GB" sz="900">
+                        <a:effectLst/>
                         <a:latin typeface="Calibri"/>
                         <a:ea typeface="Calibri"/>
-                        <a:cs typeface="Calibri"/>
-                        <a:sym typeface="Calibri"/>
+                        <a:cs typeface="Times New Roman"/>
                       </a:endParaRPr>
                     </a:p>
                   </a:txBody>
-                  <a:tcPr marL="45720" marR="45720" horzOverflow="overflow">
-                    <a:solidFill>
-                      <a:srgbClr val="D1DFCD"/>
-                    </a:solidFill>
-                  </a:tcPr>
+                  <a:tcPr marL="71659" marR="71659" marT="35830" marB="35830"/>
                 </a:tc>
                 <a:tc>
                   <a:txBody>
                     <a:bodyPr/>
                     <a:lstStyle/>
                     <a:p>
-                      <a:pPr marL="209550" lvl="0" indent="-209550" algn="l">
+                      <a:pPr marL="342900" lvl="0" indent="-342900" algn="l">
                         <a:lnSpc>
                           <a:spcPct val="115000"/>
                         </a:lnSpc>
-                        <a:buSzPct val="100000"/>
+                        <a:spcAft>
+                          <a:spcPts val="0"/>
+                        </a:spcAft>
                         <a:buFont typeface="Symbol"/>
-                        <a:buChar char="•"/>
-                        <a:defRPr sz="1800" b="0" i="0"/>
+                        <a:buChar char=""/>
                       </a:pPr>
                       <a:r>
-                        <a:rPr sz="1100" b="1" i="1">
-                          <a:latin typeface="Calibri"/>
-                          <a:ea typeface="Calibri"/>
-                          <a:cs typeface="Calibri"/>
-                          <a:sym typeface="Calibri"/>
+                        <a:rPr lang="de-CH" sz="900">
+                          <a:effectLst/>
                         </a:rPr>
                         <a:t>Endgültiges Produkt definieren </a:t>
                       </a:r>
+                      <a:endParaRPr lang="en-GB" sz="900">
+                        <a:effectLst/>
+                        <a:latin typeface="Calibri"/>
+                        <a:ea typeface="Calibri"/>
+                        <a:cs typeface="Times New Roman"/>
+                      </a:endParaRPr>
                     </a:p>
                   </a:txBody>
-                  <a:tcPr marL="45720" marR="45720" horzOverflow="overflow">
-                    <a:solidFill>
-                      <a:srgbClr val="D1DFCD"/>
-                    </a:solidFill>
-                  </a:tcPr>
+                  <a:tcPr marL="71659" marR="71659" marT="35830" marB="35830"/>
                 </a:tc>
                 <a:tc>
                   <a:txBody>
                     <a:bodyPr/>
                     <a:lstStyle/>
                     <a:p>
-                      <a:pPr lvl="0" algn="l">
+                      <a:pPr algn="l">
                         <a:lnSpc>
                           <a:spcPct val="115000"/>
                         </a:lnSpc>
-                        <a:defRPr sz="1800" b="0" i="0"/>
+                        <a:spcAft>
+                          <a:spcPts val="0"/>
+                        </a:spcAft>
                       </a:pPr>
                       <a:r>
-                        <a:rPr sz="1100" b="1" i="1">
-                          <a:latin typeface="Calibri"/>
-                          <a:ea typeface="Calibri"/>
-                          <a:cs typeface="Calibri"/>
-                          <a:sym typeface="Calibri"/>
+                        <a:rPr lang="de-CH" sz="900" dirty="0">
+                          <a:effectLst/>
                         </a:rPr>
-                        <a:t>Endgültige Software</a:t>
+                        <a:t>Endgültiges Produkt</a:t>
                       </a:r>
+                      <a:endParaRPr lang="en-GB" sz="900" dirty="0">
+                        <a:effectLst/>
+                        <a:latin typeface="Calibri"/>
+                        <a:ea typeface="Calibri"/>
+                        <a:cs typeface="Times New Roman"/>
+                      </a:endParaRPr>
                     </a:p>
                   </a:txBody>
-                  <a:tcPr marL="45720" marR="45720" horzOverflow="overflow">
-                    <a:solidFill>
-                      <a:srgbClr val="D1DFCD"/>
-                    </a:solidFill>
-                  </a:tcPr>
+                  <a:tcPr marL="71659" marR="71659" marT="35830" marB="35830"/>
                 </a:tc>
               </a:tr>
             </a:tbl>

</xml_diff>

<commit_message>
Table Style (still not shown in presentation)
</commit_message>
<xml_diff>
--- a/doc/task02/Task2_fin_v2.pptx
+++ b/doc/task02/Task2_fin_v2.pptx
@@ -548,6 +548,26 @@
             </a:lvl1pPr>
           </a:lstStyle>
           <a:p>
+            <a:pPr fontAlgn="t"/>
+            <a:endParaRPr lang="de-CH" sz="1200" b="0" i="0" u="none" strike="noStrike" dirty="0" smtClean="0">
+              <a:effectLst/>
+              <a:latin typeface="Calibri"/>
+              <a:ea typeface="Calibri"/>
+              <a:cs typeface="Calibri"/>
+              <a:sym typeface="Calibri"/>
+            </a:endParaRPr>
+          </a:p>
+          <a:p>
+            <a:pPr fontAlgn="t"/>
+            <a:endParaRPr lang="en-GB" sz="1200" b="0" i="0" u="none" strike="noStrike" dirty="0" smtClean="0">
+              <a:effectLst/>
+              <a:latin typeface="Calibri"/>
+              <a:ea typeface="Calibri"/>
+              <a:cs typeface="Calibri"/>
+              <a:sym typeface="Calibri"/>
+            </a:endParaRPr>
+          </a:p>
+          <a:p>
             <a:pPr lvl="0">
               <a:defRPr sz="1800"/>
             </a:pPr>
@@ -1515,7 +1535,7 @@
             <a:effectLst/>
             <a:extLst>
               <a:ext uri="{C572A759-6A51-4108-AA02-DFA0A04FC94B}">
-                <ma14:wrappingTextBoxFlag xmlns:ma14="http://schemas.microsoft.com/office/mac/drawingml/2011/main" xmlns="" val="1"/>
+                <ma14:wrappingTextBoxFlag xmlns="" xmlns:ma14="http://schemas.microsoft.com/office/mac/drawingml/2011/main" val="1"/>
               </a:ext>
             </a:extLst>
           </p:spPr>
@@ -3009,7 +3029,7 @@
           </a:ln>
           <a:extLst>
             <a:ext uri="{C572A759-6A51-4108-AA02-DFA0A04FC94B}">
-              <ma14:wrappingTextBoxFlag xmlns:ma14="http://schemas.microsoft.com/office/mac/drawingml/2011/main" xmlns="" val="1"/>
+              <ma14:wrappingTextBoxFlag xmlns="" xmlns:ma14="http://schemas.microsoft.com/office/mac/drawingml/2011/main" val="1"/>
             </a:ext>
           </a:extLst>
         </p:spPr>
@@ -3101,7 +3121,7 @@
           </a:ln>
           <a:extLst>
             <a:ext uri="{C572A759-6A51-4108-AA02-DFA0A04FC94B}">
-              <ma14:wrappingTextBoxFlag xmlns:ma14="http://schemas.microsoft.com/office/mac/drawingml/2011/main" xmlns="" val="1"/>
+              <ma14:wrappingTextBoxFlag xmlns="" xmlns:ma14="http://schemas.microsoft.com/office/mac/drawingml/2011/main" val="1"/>
             </a:ext>
           </a:extLst>
         </p:spPr>
@@ -3163,7 +3183,7 @@
           </a:ln>
           <a:extLst>
             <a:ext uri="{C572A759-6A51-4108-AA02-DFA0A04FC94B}">
-              <ma14:wrappingTextBoxFlag xmlns:ma14="http://schemas.microsoft.com/office/mac/drawingml/2011/main" xmlns="" val="1"/>
+              <ma14:wrappingTextBoxFlag xmlns="" xmlns:ma14="http://schemas.microsoft.com/office/mac/drawingml/2011/main" val="1"/>
             </a:ext>
           </a:extLst>
         </p:spPr>
@@ -4911,14 +4931,14 @@
           <p:nvPr>
             <p:extLst>
               <p:ext uri="{D42A27DB-BD31-4B8C-83A1-F6EECF244321}">
-                <p14:modId xmlns:p14="http://schemas.microsoft.com/office/powerpoint/2010/main" val="788261781"/>
+                <p14:modId xmlns:p14="http://schemas.microsoft.com/office/powerpoint/2010/main" val="4264038399"/>
               </p:ext>
             </p:extLst>
           </p:nvPr>
         </p:nvGraphicFramePr>
         <p:xfrm>
-          <a:off x="869470" y="948785"/>
-          <a:ext cx="7813136" cy="5242289"/>
+          <a:off x="717070" y="1065625"/>
+          <a:ext cx="7813136" cy="3628295"/>
         </p:xfrm>
         <a:graphic>
           <a:graphicData uri="http://schemas.openxmlformats.org/drawingml/2006/table">
@@ -5050,7 +5070,7 @@
                   <a:tcPr marL="71659" marR="71659" marT="35830" marB="35830"/>
                 </a:tc>
               </a:tr>
-              <a:tr h="909292">
+              <a:tr h="563246">
                 <a:tc>
                   <a:txBody>
                     <a:bodyPr/>
@@ -5065,12 +5085,12 @@
                         </a:spcAft>
                       </a:pPr>
                       <a:r>
-                        <a:rPr lang="de-CH" sz="900">
+                        <a:rPr lang="de-CH" sz="900" dirty="0">
                           <a:effectLst/>
                         </a:rPr>
                         <a:t>Spezifikation</a:t>
                       </a:r>
-                      <a:endParaRPr lang="en-GB" sz="900">
+                      <a:endParaRPr lang="en-GB" sz="900" dirty="0">
                         <a:effectLst/>
                         <a:latin typeface="Calibri"/>
                         <a:ea typeface="Calibri"/>
@@ -5078,7 +5098,14 @@
                       </a:endParaRPr>
                     </a:p>
                   </a:txBody>
-                  <a:tcPr marL="71659" marR="71659" marT="35830" marB="35830"/>
+                  <a:tcPr marL="71659" marR="71659" marT="35830" marB="35830">
+                    <a:solidFill>
+                      <a:schemeClr val="accent2">
+                        <a:lumMod val="40000"/>
+                        <a:lumOff val="60000"/>
+                      </a:schemeClr>
+                    </a:solidFill>
+                  </a:tcPr>
                 </a:tc>
                 <a:tc>
                   <a:txBody>
@@ -5096,12 +5123,12 @@
                         <a:buChar char=""/>
                       </a:pPr>
                       <a:r>
-                        <a:rPr lang="de-CH" sz="900">
+                        <a:rPr lang="de-CH" sz="900" dirty="0">
                           <a:effectLst/>
                         </a:rPr>
                         <a:t>Anforderungen Definiert</a:t>
                       </a:r>
-                      <a:endParaRPr lang="en-GB" sz="900">
+                      <a:endParaRPr lang="en-GB" sz="900" dirty="0">
                         <a:effectLst/>
                       </a:endParaRPr>
                     </a:p>
@@ -5117,12 +5144,12 @@
                         <a:buChar char=""/>
                       </a:pPr>
                       <a:r>
-                        <a:rPr lang="de-CH" sz="900">
+                        <a:rPr lang="de-CH" sz="900" dirty="0">
                           <a:effectLst/>
                         </a:rPr>
                         <a:t>Rahmen Planung</a:t>
                       </a:r>
-                      <a:endParaRPr lang="en-GB" sz="900">
+                      <a:endParaRPr lang="en-GB" sz="900" dirty="0">
                         <a:effectLst/>
                       </a:endParaRPr>
                     </a:p>
@@ -5138,12 +5165,12 @@
                         <a:buChar char=""/>
                       </a:pPr>
                       <a:r>
-                        <a:rPr lang="de-CH" sz="900">
+                        <a:rPr lang="de-CH" sz="900" dirty="0">
                           <a:effectLst/>
                         </a:rPr>
                         <a:t>Wichtige Entscheidungen getroffen</a:t>
                       </a:r>
-                      <a:endParaRPr lang="en-GB" sz="900">
+                      <a:endParaRPr lang="en-GB" sz="900" dirty="0">
                         <a:effectLst/>
                         <a:latin typeface="Calibri"/>
                         <a:ea typeface="Calibri"/>
@@ -5151,7 +5178,14 @@
                       </a:endParaRPr>
                     </a:p>
                   </a:txBody>
-                  <a:tcPr marL="71659" marR="71659" marT="35830" marB="35830"/>
+                  <a:tcPr marL="71659" marR="71659" marT="35830" marB="35830">
+                    <a:solidFill>
+                      <a:schemeClr val="accent2">
+                        <a:lumMod val="40000"/>
+                        <a:lumOff val="60000"/>
+                      </a:schemeClr>
+                    </a:solidFill>
+                  </a:tcPr>
                 </a:tc>
                 <a:tc>
                   <a:txBody>
@@ -5169,12 +5203,12 @@
                         <a:buChar char=""/>
                       </a:pPr>
                       <a:r>
-                        <a:rPr lang="de-CH" sz="900">
+                        <a:rPr lang="de-CH" sz="900" dirty="0">
                           <a:effectLst/>
                         </a:rPr>
                         <a:t>Entscheidung treffen</a:t>
                       </a:r>
-                      <a:endParaRPr lang="en-GB" sz="900">
+                      <a:endParaRPr lang="en-GB" sz="900" dirty="0">
                         <a:effectLst/>
                       </a:endParaRPr>
                     </a:p>
@@ -5190,12 +5224,12 @@
                         <a:buChar char=""/>
                       </a:pPr>
                       <a:r>
-                        <a:rPr lang="de-CH" sz="900">
+                        <a:rPr lang="de-CH" sz="900" dirty="0">
                           <a:effectLst/>
                         </a:rPr>
                         <a:t>Prioritäten definieren</a:t>
                       </a:r>
-                      <a:endParaRPr lang="en-GB" sz="900">
+                      <a:endParaRPr lang="en-GB" sz="900" dirty="0">
                         <a:effectLst/>
                       </a:endParaRPr>
                     </a:p>
@@ -5211,12 +5245,12 @@
                         <a:buChar char=""/>
                       </a:pPr>
                       <a:r>
-                        <a:rPr lang="de-CH" sz="900">
+                        <a:rPr lang="de-CH" sz="900" dirty="0">
                           <a:effectLst/>
                         </a:rPr>
                         <a:t>Planen</a:t>
                       </a:r>
-                      <a:endParaRPr lang="en-GB" sz="900">
+                      <a:endParaRPr lang="en-GB" sz="900" dirty="0">
                         <a:effectLst/>
                         <a:latin typeface="Calibri"/>
                         <a:ea typeface="Calibri"/>
@@ -5224,7 +5258,14 @@
                       </a:endParaRPr>
                     </a:p>
                   </a:txBody>
-                  <a:tcPr marL="71659" marR="71659" marT="35830" marB="35830"/>
+                  <a:tcPr marL="71659" marR="71659" marT="35830" marB="35830">
+                    <a:solidFill>
+                      <a:schemeClr val="accent2">
+                        <a:lumMod val="40000"/>
+                        <a:lumOff val="60000"/>
+                      </a:schemeClr>
+                    </a:solidFill>
+                  </a:tcPr>
                 </a:tc>
                 <a:tc>
                   <a:txBody>
@@ -5240,12 +5281,12 @@
                         </a:spcAft>
                       </a:pPr>
                       <a:r>
-                        <a:rPr lang="de-CH" sz="900">
+                        <a:rPr lang="de-CH" sz="900" dirty="0">
                           <a:effectLst/>
                         </a:rPr>
                         <a:t>Dokumentation und grobe gesamt Planung</a:t>
                       </a:r>
-                      <a:endParaRPr lang="en-GB" sz="900">
+                      <a:endParaRPr lang="en-GB" sz="900" dirty="0">
                         <a:effectLst/>
                         <a:latin typeface="Calibri"/>
                         <a:ea typeface="Calibri"/>
@@ -5253,7 +5294,14 @@
                       </a:endParaRPr>
                     </a:p>
                   </a:txBody>
-                  <a:tcPr marL="71659" marR="71659" marT="35830" marB="35830"/>
+                  <a:tcPr marL="71659" marR="71659" marT="35830" marB="35830">
+                    <a:solidFill>
+                      <a:schemeClr val="accent2">
+                        <a:lumMod val="40000"/>
+                        <a:lumOff val="60000"/>
+                      </a:schemeClr>
+                    </a:solidFill>
+                  </a:tcPr>
                 </a:tc>
               </a:tr>
               <a:tr h="245649">
@@ -5317,7 +5365,7 @@
                   <a:tcPr/>
                 </a:tc>
               </a:tr>
-              <a:tr h="766990">
+              <a:tr h="521431">
                 <a:tc>
                   <a:txBody>
                     <a:bodyPr/>
@@ -5514,7 +5562,7 @@
                   <a:tcPr marL="71659" marR="71659" marT="35830" marB="35830"/>
                 </a:tc>
               </a:tr>
-              <a:tr h="497881">
+              <a:tr h="372809">
                 <a:tc>
                   <a:txBody>
                     <a:bodyPr/>
@@ -5657,7 +5705,7 @@
                   <a:tcPr marL="71659" marR="71659" marT="35830" marB="35830"/>
                 </a:tc>
               </a:tr>
-              <a:tr h="583471">
+              <a:tr h="392081">
                 <a:tc>
                   <a:txBody>
                     <a:bodyPr/>
@@ -5779,7 +5827,7 @@
                   <a:tcPr marL="71659" marR="71659" marT="35830" marB="35830"/>
                 </a:tc>
               </a:tr>
-              <a:tr h="624689">
+              <a:tr h="396240">
                 <a:tc>
                   <a:txBody>
                     <a:bodyPr/>
@@ -5906,12 +5954,12 @@
                         </a:spcAft>
                       </a:pPr>
                       <a:r>
-                        <a:rPr lang="de-CH" sz="900">
+                        <a:rPr lang="de-CH" sz="900" dirty="0">
                           <a:effectLst/>
                         </a:rPr>
                         <a:t>Getestete Software Version</a:t>
                       </a:r>
-                      <a:endParaRPr lang="en-GB" sz="900">
+                      <a:endParaRPr lang="en-GB" sz="900" dirty="0">
                         <a:effectLst/>
                         <a:latin typeface="Calibri"/>
                         <a:ea typeface="Calibri"/>
@@ -5922,7 +5970,7 @@
                   <a:tcPr marL="71659" marR="71659" marT="35830" marB="35830"/>
                 </a:tc>
               </a:tr>
-              <a:tr h="624689">
+              <a:tr h="391160">
                 <a:tc>
                   <a:txBody>
                     <a:bodyPr/>
@@ -6126,7 +6174,7 @@
                   <a:tcPr/>
                 </a:tc>
               </a:tr>
-              <a:tr h="498330">
+              <a:tr h="236951">
                 <a:tc>
                   <a:txBody>
                     <a:bodyPr/>
@@ -6141,12 +6189,12 @@
                         </a:spcAft>
                       </a:pPr>
                       <a:r>
-                        <a:rPr lang="de-CH" sz="900">
+                        <a:rPr lang="de-CH" sz="900" dirty="0">
                           <a:effectLst/>
                         </a:rPr>
                         <a:t>Abschluss</a:t>
                       </a:r>
-                      <a:endParaRPr lang="en-GB" sz="900">
+                      <a:endParaRPr lang="en-GB" sz="900" dirty="0">
                         <a:effectLst/>
                         <a:latin typeface="Calibri"/>
                         <a:ea typeface="Calibri"/>
@@ -6154,7 +6202,14 @@
                       </a:endParaRPr>
                     </a:p>
                   </a:txBody>
-                  <a:tcPr marL="71659" marR="71659" marT="35830" marB="35830"/>
+                  <a:tcPr marL="71659" marR="71659" marT="35830" marB="35830">
+                    <a:solidFill>
+                      <a:schemeClr val="accent2">
+                        <a:lumMod val="40000"/>
+                        <a:lumOff val="60000"/>
+                      </a:schemeClr>
+                    </a:solidFill>
+                  </a:tcPr>
                 </a:tc>
                 <a:tc>
                   <a:txBody>
@@ -6172,12 +6227,12 @@
                         <a:buChar char=""/>
                       </a:pPr>
                       <a:r>
-                        <a:rPr lang="de-CH" sz="900">
+                        <a:rPr lang="de-CH" sz="900" dirty="0">
                           <a:effectLst/>
                         </a:rPr>
                         <a:t>Produkt Auslieferbereit und Fehlerfrei</a:t>
                       </a:r>
-                      <a:endParaRPr lang="en-GB" sz="900">
+                      <a:endParaRPr lang="en-GB" sz="900" dirty="0">
                         <a:effectLst/>
                         <a:latin typeface="Calibri"/>
                         <a:ea typeface="Calibri"/>
@@ -6185,7 +6240,14 @@
                       </a:endParaRPr>
                     </a:p>
                   </a:txBody>
-                  <a:tcPr marL="71659" marR="71659" marT="35830" marB="35830"/>
+                  <a:tcPr marL="71659" marR="71659" marT="35830" marB="35830">
+                    <a:solidFill>
+                      <a:schemeClr val="accent2">
+                        <a:lumMod val="40000"/>
+                        <a:lumOff val="60000"/>
+                      </a:schemeClr>
+                    </a:solidFill>
+                  </a:tcPr>
                 </a:tc>
                 <a:tc>
                   <a:txBody>
@@ -6203,12 +6265,12 @@
                         <a:buChar char=""/>
                       </a:pPr>
                       <a:r>
-                        <a:rPr lang="de-CH" sz="900">
+                        <a:rPr lang="de-CH" sz="900" dirty="0">
                           <a:effectLst/>
                         </a:rPr>
                         <a:t>Endgültiges Produkt definieren </a:t>
                       </a:r>
-                      <a:endParaRPr lang="en-GB" sz="900">
+                      <a:endParaRPr lang="en-GB" sz="900" dirty="0">
                         <a:effectLst/>
                         <a:latin typeface="Calibri"/>
                         <a:ea typeface="Calibri"/>
@@ -6216,7 +6278,14 @@
                       </a:endParaRPr>
                     </a:p>
                   </a:txBody>
-                  <a:tcPr marL="71659" marR="71659" marT="35830" marB="35830"/>
+                  <a:tcPr marL="71659" marR="71659" marT="35830" marB="35830">
+                    <a:solidFill>
+                      <a:schemeClr val="accent2">
+                        <a:lumMod val="40000"/>
+                        <a:lumOff val="60000"/>
+                      </a:schemeClr>
+                    </a:solidFill>
+                  </a:tcPr>
                 </a:tc>
                 <a:tc>
                   <a:txBody>
@@ -6245,7 +6314,14 @@
                       </a:endParaRPr>
                     </a:p>
                   </a:txBody>
-                  <a:tcPr marL="71659" marR="71659" marT="35830" marB="35830"/>
+                  <a:tcPr marL="71659" marR="71659" marT="35830" marB="35830">
+                    <a:solidFill>
+                      <a:schemeClr val="accent2">
+                        <a:lumMod val="40000"/>
+                        <a:lumOff val="60000"/>
+                      </a:schemeClr>
+                    </a:solidFill>
+                  </a:tcPr>
                 </a:tc>
               </a:tr>
             </a:tbl>
@@ -6257,11 +6333,11 @@
   <p:clrMapOvr>
     <a:masterClrMapping/>
   </p:clrMapOvr>
-  <mc:AlternateContent xmlns:mc="http://schemas.openxmlformats.org/markup-compatibility/2006" xmlns:p14="http://schemas.microsoft.com/office/powerpoint/2010/main">
-    <mc:Choice Requires="p14">
+  <mc:AlternateContent xmlns:mc="http://schemas.openxmlformats.org/markup-compatibility/2006">
+    <mc:Choice xmlns:p14="http://schemas.microsoft.com/office/powerpoint/2010/main" Requires="p14">
       <p:transition p14:dur="0"/>
     </mc:Choice>
-    <mc:Fallback xmlns="">
+    <mc:Fallback>
       <p:transition/>
     </mc:Fallback>
   </mc:AlternateContent>

</xml_diff>